<commit_message>
All the changes over summer 2015, including data, simulations, model fitting scripts, etc.
</commit_message>
<xml_diff>
--- a/Papers/Main/Figures.pptx
+++ b/Papers/Main/Figures.pptx
@@ -5,7 +5,7 @@
     <p:sldMasterId id="2147483648" r:id="rId1"/>
   </p:sldMasterIdLst>
   <p:notesMasterIdLst>
-    <p:notesMasterId r:id="rId13"/>
+    <p:notesMasterId r:id="rId15"/>
   </p:notesMasterIdLst>
   <p:sldIdLst>
     <p:sldId id="256" r:id="rId2"/>
@@ -19,6 +19,8 @@
     <p:sldId id="264" r:id="rId10"/>
     <p:sldId id="266" r:id="rId11"/>
     <p:sldId id="265" r:id="rId12"/>
+    <p:sldId id="267" r:id="rId13"/>
+    <p:sldId id="268" r:id="rId14"/>
   </p:sldIdLst>
   <p:sldSz cx="13004800" cy="9753600"/>
   <p:notesSz cx="6858000" cy="9144000"/>
@@ -245,11 +247,11 @@
         </c:dLbls>
         <c:gapWidth val="40"/>
         <c:overlap val="-10"/>
-        <c:axId val="42334848"/>
-        <c:axId val="42066304"/>
+        <c:axId val="73581696"/>
+        <c:axId val="73583616"/>
       </c:barChart>
       <c:catAx>
-        <c:axId val="42334848"/>
+        <c:axId val="73581696"/>
         <c:scaling>
           <c:orientation val="minMax"/>
         </c:scaling>
@@ -284,7 +286,7 @@
             <a:endParaRPr lang="en-US"/>
           </a:p>
         </c:txPr>
-        <c:crossAx val="42066304"/>
+        <c:crossAx val="73583616"/>
         <c:crosses val="autoZero"/>
         <c:auto val="1"/>
         <c:lblAlgn val="ctr"/>
@@ -292,7 +294,7 @@
         <c:noMultiLvlLbl val="1"/>
       </c:catAx>
       <c:valAx>
-        <c:axId val="42066304"/>
+        <c:axId val="73583616"/>
         <c:scaling>
           <c:orientation val="minMax"/>
           <c:max val="100"/>
@@ -378,7 +380,7 @@
             <a:endParaRPr lang="en-US"/>
           </a:p>
         </c:txPr>
-        <c:crossAx val="42334848"/>
+        <c:crossAx val="73581696"/>
         <c:crosses val="autoZero"/>
         <c:crossBetween val="between"/>
         <c:majorUnit val="25"/>
@@ -582,11 +584,11 @@
         </c:dLbls>
         <c:gapWidth val="40"/>
         <c:overlap val="-10"/>
-        <c:axId val="50994560"/>
-        <c:axId val="51033216"/>
+        <c:axId val="118892416"/>
+        <c:axId val="118893952"/>
       </c:barChart>
       <c:catAx>
-        <c:axId val="50994560"/>
+        <c:axId val="118892416"/>
         <c:scaling>
           <c:orientation val="minMax"/>
         </c:scaling>
@@ -621,7 +623,7 @@
             <a:endParaRPr lang="en-US"/>
           </a:p>
         </c:txPr>
-        <c:crossAx val="51033216"/>
+        <c:crossAx val="118893952"/>
         <c:crosses val="autoZero"/>
         <c:auto val="1"/>
         <c:lblAlgn val="ctr"/>
@@ -629,7 +631,7 @@
         <c:noMultiLvlLbl val="1"/>
       </c:catAx>
       <c:valAx>
-        <c:axId val="51033216"/>
+        <c:axId val="118893952"/>
         <c:scaling>
           <c:orientation val="minMax"/>
           <c:max val="100"/>
@@ -715,7 +717,7 @@
             <a:endParaRPr lang="en-US"/>
           </a:p>
         </c:txPr>
-        <c:crossAx val="50994560"/>
+        <c:crossAx val="118892416"/>
         <c:crosses val="autoZero"/>
         <c:crossBetween val="between"/>
         <c:majorUnit val="25"/>
@@ -943,11 +945,11 @@
         </c:dLbls>
         <c:gapWidth val="40"/>
         <c:overlap val="-10"/>
-        <c:axId val="139774976"/>
-        <c:axId val="139784960"/>
+        <c:axId val="39141760"/>
+        <c:axId val="39143296"/>
       </c:barChart>
       <c:catAx>
-        <c:axId val="139774976"/>
+        <c:axId val="39141760"/>
         <c:scaling>
           <c:orientation val="minMax"/>
         </c:scaling>
@@ -982,7 +984,7 @@
             <a:endParaRPr lang="en-US"/>
           </a:p>
         </c:txPr>
-        <c:crossAx val="139784960"/>
+        <c:crossAx val="39143296"/>
         <c:crosses val="autoZero"/>
         <c:auto val="1"/>
         <c:lblAlgn val="ctr"/>
@@ -990,7 +992,7 @@
         <c:noMultiLvlLbl val="1"/>
       </c:catAx>
       <c:valAx>
-        <c:axId val="139784960"/>
+        <c:axId val="39143296"/>
         <c:scaling>
           <c:orientation val="minMax"/>
           <c:max val="100"/>
@@ -1076,7 +1078,7 @@
             <a:endParaRPr lang="en-US"/>
           </a:p>
         </c:txPr>
-        <c:crossAx val="139774976"/>
+        <c:crossAx val="39141760"/>
         <c:crosses val="autoZero"/>
         <c:crossBetween val="between"/>
         <c:majorUnit val="25"/>
@@ -4672,6 +4674,3493 @@
 </p:sld>
 </file>
 
+<file path=ppt/slides/slide12.xml><?xml version="1.0" encoding="utf-8"?>
+<p:sld xmlns:a="http://schemas.openxmlformats.org/drawingml/2006/main" xmlns:r="http://schemas.openxmlformats.org/officeDocument/2006/relationships" xmlns:p="http://schemas.openxmlformats.org/presentationml/2006/main">
+  <p:cSld>
+    <p:spTree>
+      <p:nvGrpSpPr>
+        <p:cNvPr id="1" name=""/>
+        <p:cNvGrpSpPr/>
+        <p:nvPr/>
+      </p:nvGrpSpPr>
+      <p:grpSpPr>
+        <a:xfrm>
+          <a:off x="0" y="0"/>
+          <a:ext cx="0" cy="0"/>
+          <a:chOff x="0" y="0"/>
+          <a:chExt cx="0" cy="0"/>
+        </a:xfrm>
+      </p:grpSpPr>
+      <p:sp>
+        <p:nvSpPr>
+          <p:cNvPr id="32" name="Shape 32"/>
+          <p:cNvSpPr/>
+          <p:nvPr/>
+        </p:nvSpPr>
+        <p:spPr>
+          <a:xfrm>
+            <a:off x="5799987" y="3910435"/>
+            <a:ext cx="778613" cy="556261"/>
+          </a:xfrm>
+          <a:prstGeom prst="rect">
+            <a:avLst/>
+          </a:prstGeom>
+          <a:ln w="12700">
+            <a:miter lim="400000"/>
+          </a:ln>
+          <a:extLst>
+            <a:ext uri="{C572A759-6A51-4108-AA02-DFA0A04FC94B}">
+              <ma14:wrappingTextBoxFlag xmlns:ma14="http://schemas.microsoft.com/office/mac/drawingml/2011/main" xmlns="" val="1"/>
+            </a:ext>
+          </a:extLst>
+        </p:spPr>
+        <p:txBody>
+          <a:bodyPr wrap="none" lIns="0" tIns="0" rIns="0" bIns="0" anchor="ctr">
+            <a:spAutoFit/>
+          </a:bodyPr>
+          <a:lstStyle/>
+          <a:p>
+            <a:pPr lvl="0">
+              <a:defRPr sz="1800"/>
+            </a:pPr>
+            <a:r>
+              <a:rPr sz="3600" dirty="0">
+                <a:solidFill>
+                  <a:schemeClr val="tx1"/>
+                </a:solidFill>
+                <a:latin typeface="Whitney Medium"/>
+                <a:ea typeface="Whitney Medium"/>
+                <a:cs typeface="Whitney Medium"/>
+                <a:sym typeface="Whitney Medium"/>
+              </a:rPr>
+              <a:t>$R</a:t>
+            </a:r>
+            <a:r>
+              <a:rPr sz="3600" baseline="-5999" dirty="0">
+                <a:solidFill>
+                  <a:schemeClr val="tx1"/>
+                </a:solidFill>
+                <a:latin typeface="Whitney Medium"/>
+                <a:ea typeface="Whitney Medium"/>
+                <a:cs typeface="Whitney Medium"/>
+                <a:sym typeface="Whitney Medium"/>
+              </a:rPr>
+              <a:t>2</a:t>
+            </a:r>
+          </a:p>
+        </p:txBody>
+      </p:sp>
+      <p:sp>
+        <p:nvSpPr>
+          <p:cNvPr id="33" name="Shape 33"/>
+          <p:cNvSpPr/>
+          <p:nvPr/>
+        </p:nvSpPr>
+        <p:spPr>
+          <a:xfrm>
+            <a:off x="4982657" y="3194193"/>
+            <a:ext cx="1" cy="556261"/>
+          </a:xfrm>
+          <a:prstGeom prst="line">
+            <a:avLst/>
+          </a:prstGeom>
+          <a:ln w="76200">
+            <a:solidFill/>
+            <a:miter lim="400000"/>
+            <a:tailEnd type="triangle"/>
+          </a:ln>
+        </p:spPr>
+        <p:txBody>
+          <a:bodyPr lIns="0" tIns="0" rIns="0" bIns="0"/>
+          <a:lstStyle/>
+          <a:p>
+            <a:pPr lvl="0">
+              <a:defRPr sz="3000">
+                <a:solidFill>
+                  <a:srgbClr val="FFFFFF"/>
+                </a:solidFill>
+                <a:effectLst>
+                  <a:outerShdw blurRad="38100" dist="12700" dir="5400000" rotWithShape="0">
+                    <a:srgbClr val="000000">
+                      <a:alpha val="50000"/>
+                    </a:srgbClr>
+                  </a:outerShdw>
+                </a:effectLst>
+                <a:latin typeface="Gill Sans"/>
+                <a:ea typeface="Gill Sans"/>
+                <a:cs typeface="Gill Sans"/>
+                <a:sym typeface="Gill Sans"/>
+              </a:defRPr>
+            </a:pPr>
+            <a:endParaRPr/>
+          </a:p>
+        </p:txBody>
+      </p:sp>
+      <p:sp>
+        <p:nvSpPr>
+          <p:cNvPr id="34" name="Shape 34"/>
+          <p:cNvSpPr/>
+          <p:nvPr/>
+        </p:nvSpPr>
+        <p:spPr>
+          <a:xfrm>
+            <a:off x="6155401" y="3185962"/>
+            <a:ext cx="1" cy="556261"/>
+          </a:xfrm>
+          <a:prstGeom prst="line">
+            <a:avLst/>
+          </a:prstGeom>
+          <a:ln w="76200">
+            <a:solidFill/>
+            <a:miter lim="400000"/>
+            <a:tailEnd type="triangle"/>
+          </a:ln>
+        </p:spPr>
+        <p:txBody>
+          <a:bodyPr lIns="0" tIns="0" rIns="0" bIns="0"/>
+          <a:lstStyle/>
+          <a:p>
+            <a:pPr lvl="0">
+              <a:defRPr sz="3000">
+                <a:solidFill>
+                  <a:srgbClr val="FFFFFF"/>
+                </a:solidFill>
+                <a:effectLst>
+                  <a:outerShdw blurRad="38100" dist="12700" dir="5400000" rotWithShape="0">
+                    <a:srgbClr val="000000">
+                      <a:alpha val="50000"/>
+                    </a:srgbClr>
+                  </a:outerShdw>
+                </a:effectLst>
+                <a:latin typeface="Gill Sans"/>
+                <a:ea typeface="Gill Sans"/>
+                <a:cs typeface="Gill Sans"/>
+                <a:sym typeface="Gill Sans"/>
+              </a:defRPr>
+            </a:pPr>
+            <a:endParaRPr/>
+          </a:p>
+        </p:txBody>
+      </p:sp>
+      <p:sp>
+        <p:nvSpPr>
+          <p:cNvPr id="35" name="Shape 35"/>
+          <p:cNvSpPr/>
+          <p:nvPr/>
+        </p:nvSpPr>
+        <p:spPr>
+          <a:xfrm>
+            <a:off x="4597973" y="3916450"/>
+            <a:ext cx="761427" cy="553998"/>
+          </a:xfrm>
+          <a:prstGeom prst="rect">
+            <a:avLst/>
+          </a:prstGeom>
+          <a:ln w="12700">
+            <a:miter lim="400000"/>
+          </a:ln>
+          <a:extLst>
+            <a:ext uri="{C572A759-6A51-4108-AA02-DFA0A04FC94B}">
+              <ma14:wrappingTextBoxFlag xmlns:ma14="http://schemas.microsoft.com/office/mac/drawingml/2011/main" xmlns="" val="1"/>
+            </a:ext>
+          </a:extLst>
+        </p:spPr>
+        <p:txBody>
+          <a:bodyPr wrap="none" lIns="0" tIns="0" rIns="0" bIns="0" anchor="ctr">
+            <a:spAutoFit/>
+          </a:bodyPr>
+          <a:lstStyle/>
+          <a:p>
+            <a:pPr lvl="0">
+              <a:defRPr sz="1800"/>
+            </a:pPr>
+            <a:r>
+              <a:rPr sz="3600" dirty="0">
+                <a:solidFill>
+                  <a:schemeClr val="tx1"/>
+                </a:solidFill>
+                <a:latin typeface="Whitney Medium"/>
+                <a:ea typeface="Whitney Medium"/>
+                <a:cs typeface="Whitney Medium"/>
+                <a:sym typeface="Whitney Medium"/>
+              </a:rPr>
+              <a:t>$R</a:t>
+            </a:r>
+            <a:r>
+              <a:rPr sz="3600" baseline="-5999" dirty="0">
+                <a:solidFill>
+                  <a:schemeClr val="tx1"/>
+                </a:solidFill>
+                <a:latin typeface="Whitney Medium"/>
+                <a:ea typeface="Whitney Medium"/>
+                <a:cs typeface="Whitney Medium"/>
+                <a:sym typeface="Whitney Medium"/>
+              </a:rPr>
+              <a:t>1</a:t>
+            </a:r>
+          </a:p>
+        </p:txBody>
+      </p:sp>
+      <p:sp>
+        <p:nvSpPr>
+          <p:cNvPr id="39" name="Shape 39"/>
+          <p:cNvSpPr/>
+          <p:nvPr/>
+        </p:nvSpPr>
+        <p:spPr>
+          <a:xfrm>
+            <a:off x="4978400" y="969195"/>
+            <a:ext cx="3190901" cy="1132641"/>
+          </a:xfrm>
+          <a:prstGeom prst="line">
+            <a:avLst/>
+          </a:prstGeom>
+          <a:ln w="12700">
+            <a:solidFill/>
+            <a:miter lim="400000"/>
+            <a:tailEnd type="triangle"/>
+          </a:ln>
+        </p:spPr>
+        <p:txBody>
+          <a:bodyPr lIns="0" tIns="0" rIns="0" bIns="0"/>
+          <a:lstStyle/>
+          <a:p>
+            <a:pPr lvl="0">
+              <a:defRPr sz="3000">
+                <a:solidFill>
+                  <a:srgbClr val="FFFFFF"/>
+                </a:solidFill>
+                <a:effectLst>
+                  <a:outerShdw blurRad="38100" dist="12700" dir="5400000" rotWithShape="0">
+                    <a:srgbClr val="000000">
+                      <a:alpha val="50000"/>
+                    </a:srgbClr>
+                  </a:outerShdw>
+                </a:effectLst>
+                <a:latin typeface="Gill Sans"/>
+                <a:ea typeface="Gill Sans"/>
+                <a:cs typeface="Gill Sans"/>
+                <a:sym typeface="Gill Sans"/>
+              </a:defRPr>
+            </a:pPr>
+            <a:endParaRPr/>
+          </a:p>
+        </p:txBody>
+      </p:sp>
+      <p:sp>
+        <p:nvSpPr>
+          <p:cNvPr id="40" name="Shape 40"/>
+          <p:cNvSpPr/>
+          <p:nvPr/>
+        </p:nvSpPr>
+        <p:spPr>
+          <a:xfrm>
+            <a:off x="6159322" y="969194"/>
+            <a:ext cx="2009979" cy="1132642"/>
+          </a:xfrm>
+          <a:prstGeom prst="line">
+            <a:avLst/>
+          </a:prstGeom>
+          <a:ln w="12700">
+            <a:solidFill/>
+            <a:miter lim="400000"/>
+            <a:tailEnd type="triangle"/>
+          </a:ln>
+        </p:spPr>
+        <p:txBody>
+          <a:bodyPr lIns="0" tIns="0" rIns="0" bIns="0"/>
+          <a:lstStyle/>
+          <a:p>
+            <a:pPr lvl="0">
+              <a:defRPr sz="3000">
+                <a:solidFill>
+                  <a:srgbClr val="FFFFFF"/>
+                </a:solidFill>
+                <a:effectLst>
+                  <a:outerShdw blurRad="38100" dist="12700" dir="5400000" rotWithShape="0">
+                    <a:srgbClr val="000000">
+                      <a:alpha val="50000"/>
+                    </a:srgbClr>
+                  </a:outerShdw>
+                </a:effectLst>
+                <a:latin typeface="Gill Sans"/>
+                <a:ea typeface="Gill Sans"/>
+                <a:cs typeface="Gill Sans"/>
+                <a:sym typeface="Gill Sans"/>
+              </a:defRPr>
+            </a:pPr>
+            <a:endParaRPr/>
+          </a:p>
+        </p:txBody>
+      </p:sp>
+      <p:sp>
+        <p:nvSpPr>
+          <p:cNvPr id="43" name="Shape 43"/>
+          <p:cNvSpPr/>
+          <p:nvPr/>
+        </p:nvSpPr>
+        <p:spPr>
+          <a:xfrm>
+            <a:off x="5435600" y="236352"/>
+            <a:ext cx="270908" cy="584775"/>
+          </a:xfrm>
+          <a:prstGeom prst="rect">
+            <a:avLst/>
+          </a:prstGeom>
+          <a:solidFill>
+            <a:srgbClr val="FFFFFF"/>
+          </a:solidFill>
+          <a:ln w="12700">
+            <a:miter lim="400000"/>
+          </a:ln>
+          <a:extLst>
+            <a:ext uri="{C572A759-6A51-4108-AA02-DFA0A04FC94B}">
+              <ma14:wrappingTextBoxFlag xmlns:ma14="http://schemas.microsoft.com/office/mac/drawingml/2011/main" xmlns="" val="1"/>
+            </a:ext>
+          </a:extLst>
+        </p:spPr>
+        <p:txBody>
+          <a:bodyPr wrap="none" lIns="0" tIns="0" rIns="0" bIns="0" anchor="ctr">
+            <a:spAutoFit/>
+          </a:bodyPr>
+          <a:lstStyle>
+            <a:lvl1pPr>
+              <a:defRPr sz="3800">
+                <a:latin typeface="Helvetica"/>
+                <a:ea typeface="Helvetica"/>
+                <a:cs typeface="Helvetica"/>
+                <a:sym typeface="Helvetica"/>
+              </a:defRPr>
+            </a:lvl1pPr>
+          </a:lstStyle>
+          <a:p>
+            <a:pPr lvl="0">
+              <a:defRPr sz="1800"/>
+            </a:pPr>
+            <a:r>
+              <a:rPr lang="en-US" sz="3800" dirty="0" smtClean="0"/>
+              <a:t>4</a:t>
+            </a:r>
+            <a:endParaRPr sz="3800" dirty="0"/>
+          </a:p>
+        </p:txBody>
+      </p:sp>
+      <p:sp>
+        <p:nvSpPr>
+          <p:cNvPr id="46" name="Shape 46"/>
+          <p:cNvSpPr/>
+          <p:nvPr/>
+        </p:nvSpPr>
+        <p:spPr>
+          <a:xfrm>
+            <a:off x="3909446" y="248509"/>
+            <a:ext cx="541815" cy="584775"/>
+          </a:xfrm>
+          <a:prstGeom prst="rect">
+            <a:avLst/>
+          </a:prstGeom>
+          <a:solidFill>
+            <a:srgbClr val="FFFFFF"/>
+          </a:solidFill>
+          <a:ln w="12700">
+            <a:miter lim="400000"/>
+          </a:ln>
+          <a:extLst>
+            <a:ext uri="{C572A759-6A51-4108-AA02-DFA0A04FC94B}">
+              <ma14:wrappingTextBoxFlag xmlns:ma14="http://schemas.microsoft.com/office/mac/drawingml/2011/main" xmlns="" val="1"/>
+            </a:ext>
+          </a:extLst>
+        </p:spPr>
+        <p:txBody>
+          <a:bodyPr wrap="none" lIns="0" tIns="0" rIns="0" bIns="0" anchor="ctr">
+            <a:spAutoFit/>
+          </a:bodyPr>
+          <a:lstStyle>
+            <a:lvl1pPr>
+              <a:defRPr sz="3800">
+                <a:latin typeface="Helvetica"/>
+                <a:ea typeface="Helvetica"/>
+                <a:cs typeface="Helvetica"/>
+                <a:sym typeface="Helvetica"/>
+              </a:defRPr>
+            </a:lvl1pPr>
+          </a:lstStyle>
+          <a:p>
+            <a:pPr lvl="0">
+              <a:defRPr sz="1800"/>
+            </a:pPr>
+            <a:r>
+              <a:rPr lang="en-US" sz="3800" dirty="0" smtClean="0"/>
+              <a:t>12</a:t>
+            </a:r>
+            <a:endParaRPr sz="3800" dirty="0"/>
+          </a:p>
+        </p:txBody>
+      </p:sp>
+      <p:sp>
+        <p:nvSpPr>
+          <p:cNvPr id="47" name="Shape 47"/>
+          <p:cNvSpPr/>
+          <p:nvPr/>
+        </p:nvSpPr>
+        <p:spPr>
+          <a:xfrm>
+            <a:off x="6493985" y="235809"/>
+            <a:ext cx="541815" cy="584775"/>
+          </a:xfrm>
+          <a:prstGeom prst="rect">
+            <a:avLst/>
+          </a:prstGeom>
+          <a:solidFill>
+            <a:srgbClr val="FFFFFF"/>
+          </a:solidFill>
+          <a:ln w="12700">
+            <a:miter lim="400000"/>
+          </a:ln>
+          <a:extLst>
+            <a:ext uri="{C572A759-6A51-4108-AA02-DFA0A04FC94B}">
+              <ma14:wrappingTextBoxFlag xmlns:ma14="http://schemas.microsoft.com/office/mac/drawingml/2011/main" xmlns="" val="1"/>
+            </a:ext>
+          </a:extLst>
+        </p:spPr>
+        <p:txBody>
+          <a:bodyPr wrap="none" lIns="0" tIns="0" rIns="0" bIns="0" anchor="ctr">
+            <a:spAutoFit/>
+          </a:bodyPr>
+          <a:lstStyle>
+            <a:lvl1pPr>
+              <a:defRPr sz="3800">
+                <a:latin typeface="Helvetica"/>
+                <a:ea typeface="Helvetica"/>
+                <a:cs typeface="Helvetica"/>
+                <a:sym typeface="Helvetica"/>
+              </a:defRPr>
+            </a:lvl1pPr>
+          </a:lstStyle>
+          <a:p>
+            <a:pPr lvl="0">
+              <a:defRPr sz="1800"/>
+            </a:pPr>
+            <a:r>
+              <a:rPr lang="en-US" sz="3800" dirty="0" smtClean="0"/>
+              <a:t>17</a:t>
+            </a:r>
+            <a:endParaRPr sz="3800" dirty="0"/>
+          </a:p>
+        </p:txBody>
+      </p:sp>
+      <p:sp>
+        <p:nvSpPr>
+          <p:cNvPr id="49" name="Shape 49"/>
+          <p:cNvSpPr/>
+          <p:nvPr/>
+        </p:nvSpPr>
+        <p:spPr>
+          <a:xfrm>
+            <a:off x="4978400" y="969195"/>
+            <a:ext cx="0" cy="1069781"/>
+          </a:xfrm>
+          <a:prstGeom prst="line">
+            <a:avLst/>
+          </a:prstGeom>
+          <a:ln w="50800">
+            <a:solidFill/>
+            <a:miter lim="400000"/>
+            <a:tailEnd type="triangle"/>
+          </a:ln>
+        </p:spPr>
+        <p:txBody>
+          <a:bodyPr lIns="0" tIns="0" rIns="0" bIns="0"/>
+          <a:lstStyle/>
+          <a:p>
+            <a:pPr lvl="0">
+              <a:defRPr sz="3000">
+                <a:solidFill>
+                  <a:srgbClr val="FFFFFF"/>
+                </a:solidFill>
+                <a:effectLst>
+                  <a:outerShdw blurRad="38100" dist="12700" dir="5400000" rotWithShape="0">
+                    <a:srgbClr val="000000">
+                      <a:alpha val="50000"/>
+                    </a:srgbClr>
+                  </a:outerShdw>
+                </a:effectLst>
+                <a:latin typeface="Gill Sans"/>
+                <a:ea typeface="Gill Sans"/>
+                <a:cs typeface="Gill Sans"/>
+                <a:sym typeface="Gill Sans"/>
+              </a:defRPr>
+            </a:pPr>
+            <a:endParaRPr/>
+          </a:p>
+        </p:txBody>
+      </p:sp>
+      <p:sp>
+        <p:nvSpPr>
+          <p:cNvPr id="55" name="Shape 55"/>
+          <p:cNvSpPr/>
+          <p:nvPr/>
+        </p:nvSpPr>
+        <p:spPr>
+          <a:xfrm>
+            <a:off x="7900841" y="3940719"/>
+            <a:ext cx="772517" cy="556261"/>
+          </a:xfrm>
+          <a:prstGeom prst="rect">
+            <a:avLst/>
+          </a:prstGeom>
+          <a:ln w="12700">
+            <a:miter lim="400000"/>
+          </a:ln>
+          <a:extLst>
+            <a:ext uri="{C572A759-6A51-4108-AA02-DFA0A04FC94B}">
+              <ma14:wrappingTextBoxFlag xmlns:ma14="http://schemas.microsoft.com/office/mac/drawingml/2011/main" xmlns="" val="1"/>
+            </a:ext>
+          </a:extLst>
+        </p:spPr>
+        <p:txBody>
+          <a:bodyPr wrap="none" lIns="0" tIns="0" rIns="0" bIns="0" anchor="ctr">
+            <a:spAutoFit/>
+          </a:bodyPr>
+          <a:lstStyle/>
+          <a:p>
+            <a:pPr lvl="0">
+              <a:defRPr sz="1800"/>
+            </a:pPr>
+            <a:r>
+              <a:rPr sz="3600" dirty="0">
+                <a:solidFill>
+                  <a:schemeClr val="tx1"/>
+                </a:solidFill>
+                <a:latin typeface="Whitney Medium"/>
+                <a:ea typeface="Whitney Medium"/>
+                <a:cs typeface="Whitney Medium"/>
+                <a:sym typeface="Whitney Medium"/>
+              </a:rPr>
+              <a:t>$R</a:t>
+            </a:r>
+            <a:r>
+              <a:rPr sz="3600" baseline="-5999" dirty="0">
+                <a:solidFill>
+                  <a:schemeClr val="tx1"/>
+                </a:solidFill>
+                <a:latin typeface="Whitney Medium"/>
+                <a:ea typeface="Whitney Medium"/>
+                <a:cs typeface="Whitney Medium"/>
+                <a:sym typeface="Whitney Medium"/>
+              </a:rPr>
+              <a:t>3</a:t>
+            </a:r>
+          </a:p>
+        </p:txBody>
+      </p:sp>
+      <p:sp>
+        <p:nvSpPr>
+          <p:cNvPr id="56" name="Shape 56"/>
+          <p:cNvSpPr/>
+          <p:nvPr/>
+        </p:nvSpPr>
+        <p:spPr>
+          <a:xfrm>
+            <a:off x="8278556" y="3194193"/>
+            <a:ext cx="1" cy="556261"/>
+          </a:xfrm>
+          <a:prstGeom prst="line">
+            <a:avLst/>
+          </a:prstGeom>
+          <a:ln w="76200">
+            <a:solidFill/>
+            <a:miter lim="400000"/>
+            <a:tailEnd type="triangle"/>
+          </a:ln>
+        </p:spPr>
+        <p:txBody>
+          <a:bodyPr lIns="0" tIns="0" rIns="0" bIns="0"/>
+          <a:lstStyle/>
+          <a:p>
+            <a:pPr lvl="0">
+              <a:defRPr sz="3000">
+                <a:solidFill>
+                  <a:srgbClr val="FFFFFF"/>
+                </a:solidFill>
+                <a:effectLst>
+                  <a:outerShdw blurRad="38100" dist="12700" dir="5400000" rotWithShape="0">
+                    <a:srgbClr val="000000">
+                      <a:alpha val="50000"/>
+                    </a:srgbClr>
+                  </a:outerShdw>
+                </a:effectLst>
+                <a:latin typeface="Gill Sans"/>
+                <a:ea typeface="Gill Sans"/>
+                <a:cs typeface="Gill Sans"/>
+                <a:sym typeface="Gill Sans"/>
+              </a:defRPr>
+            </a:pPr>
+            <a:endParaRPr/>
+          </a:p>
+        </p:txBody>
+      </p:sp>
+      <p:sp>
+        <p:nvSpPr>
+          <p:cNvPr id="57" name="Shape 57"/>
+          <p:cNvSpPr/>
+          <p:nvPr/>
+        </p:nvSpPr>
+        <p:spPr>
+          <a:xfrm>
+            <a:off x="1459342" y="217046"/>
+            <a:ext cx="1689813" cy="647701"/>
+          </a:xfrm>
+          <a:prstGeom prst="rect">
+            <a:avLst/>
+          </a:prstGeom>
+          <a:ln w="12700">
+            <a:miter lim="400000"/>
+          </a:ln>
+          <a:extLst>
+            <a:ext uri="{C572A759-6A51-4108-AA02-DFA0A04FC94B}">
+              <ma14:wrappingTextBoxFlag xmlns:ma14="http://schemas.microsoft.com/office/mac/drawingml/2011/main" xmlns="" val="1"/>
+            </a:ext>
+          </a:extLst>
+        </p:spPr>
+        <p:txBody>
+          <a:bodyPr wrap="none" lIns="50800" tIns="50800" rIns="50800" bIns="50800" anchor="ctr">
+            <a:spAutoFit/>
+          </a:bodyPr>
+          <a:lstStyle>
+            <a:lvl1pPr>
+              <a:defRPr i="1"/>
+            </a:lvl1pPr>
+          </a:lstStyle>
+          <a:p>
+            <a:pPr lvl="0">
+              <a:defRPr sz="1800" i="0"/>
+            </a:pPr>
+            <a:r>
+              <a:rPr sz="3600" i="1" dirty="0"/>
+              <a:t>Stage 1</a:t>
+            </a:r>
+          </a:p>
+        </p:txBody>
+      </p:sp>
+      <p:sp>
+        <p:nvSpPr>
+          <p:cNvPr id="58" name="Shape 58"/>
+          <p:cNvSpPr/>
+          <p:nvPr/>
+        </p:nvSpPr>
+        <p:spPr>
+          <a:xfrm>
+            <a:off x="1459342" y="2361560"/>
+            <a:ext cx="1689813" cy="647701"/>
+          </a:xfrm>
+          <a:prstGeom prst="rect">
+            <a:avLst/>
+          </a:prstGeom>
+          <a:ln w="12700">
+            <a:miter lim="400000"/>
+          </a:ln>
+          <a:extLst>
+            <a:ext uri="{C572A759-6A51-4108-AA02-DFA0A04FC94B}">
+              <ma14:wrappingTextBoxFlag xmlns:ma14="http://schemas.microsoft.com/office/mac/drawingml/2011/main" xmlns="" val="1"/>
+            </a:ext>
+          </a:extLst>
+        </p:spPr>
+        <p:txBody>
+          <a:bodyPr wrap="none" lIns="50800" tIns="50800" rIns="50800" bIns="50800" anchor="ctr">
+            <a:spAutoFit/>
+          </a:bodyPr>
+          <a:lstStyle>
+            <a:lvl1pPr>
+              <a:defRPr i="1"/>
+            </a:lvl1pPr>
+          </a:lstStyle>
+          <a:p>
+            <a:pPr lvl="0">
+              <a:defRPr sz="1800" i="0"/>
+            </a:pPr>
+            <a:r>
+              <a:rPr sz="3600" i="1" dirty="0"/>
+              <a:t>Stage 2</a:t>
+            </a:r>
+          </a:p>
+        </p:txBody>
+      </p:sp>
+      <p:sp>
+        <p:nvSpPr>
+          <p:cNvPr id="59" name="Shape 59"/>
+          <p:cNvSpPr/>
+          <p:nvPr/>
+        </p:nvSpPr>
+        <p:spPr>
+          <a:xfrm>
+            <a:off x="1463686" y="3894999"/>
+            <a:ext cx="1681125" cy="647701"/>
+          </a:xfrm>
+          <a:prstGeom prst="rect">
+            <a:avLst/>
+          </a:prstGeom>
+          <a:ln w="12700">
+            <a:miter lim="400000"/>
+          </a:ln>
+          <a:extLst>
+            <a:ext uri="{C572A759-6A51-4108-AA02-DFA0A04FC94B}">
+              <ma14:wrappingTextBoxFlag xmlns:ma14="http://schemas.microsoft.com/office/mac/drawingml/2011/main" xmlns="" val="1"/>
+            </a:ext>
+          </a:extLst>
+        </p:spPr>
+        <p:txBody>
+          <a:bodyPr wrap="none" lIns="50800" tIns="50800" rIns="50800" bIns="50800" anchor="ctr">
+            <a:spAutoFit/>
+          </a:bodyPr>
+          <a:lstStyle>
+            <a:lvl1pPr>
+              <a:defRPr i="1"/>
+            </a:lvl1pPr>
+          </a:lstStyle>
+          <a:p>
+            <a:pPr lvl="0">
+              <a:defRPr sz="1800" i="0"/>
+            </a:pPr>
+            <a:r>
+              <a:rPr sz="3600" i="1" dirty="0"/>
+              <a:t>Reward</a:t>
+            </a:r>
+          </a:p>
+        </p:txBody>
+      </p:sp>
+      <p:sp>
+        <p:nvSpPr>
+          <p:cNvPr id="60" name="Shape 60"/>
+          <p:cNvSpPr/>
+          <p:nvPr/>
+        </p:nvSpPr>
+        <p:spPr>
+          <a:xfrm>
+            <a:off x="9269527" y="292100"/>
+            <a:ext cx="2256881" cy="4138921"/>
+          </a:xfrm>
+          <a:prstGeom prst="rect">
+            <a:avLst/>
+          </a:prstGeom>
+          <a:ln w="38100">
+            <a:solidFill/>
+            <a:miter lim="400000"/>
+          </a:ln>
+        </p:spPr>
+        <p:txBody>
+          <a:bodyPr lIns="0" tIns="0" rIns="0" bIns="0" anchor="ctr"/>
+          <a:lstStyle/>
+          <a:p>
+            <a:pPr lvl="0">
+              <a:defRPr sz="2400"/>
+            </a:pPr>
+            <a:endParaRPr/>
+          </a:p>
+        </p:txBody>
+      </p:sp>
+      <p:sp>
+        <p:nvSpPr>
+          <p:cNvPr id="61" name="Shape 61"/>
+          <p:cNvSpPr/>
+          <p:nvPr/>
+        </p:nvSpPr>
+        <p:spPr>
+          <a:xfrm>
+            <a:off x="9505360" y="435233"/>
+            <a:ext cx="1785215" cy="838201"/>
+          </a:xfrm>
+          <a:prstGeom prst="rect">
+            <a:avLst/>
+          </a:prstGeom>
+          <a:ln w="12700">
+            <a:miter lim="400000"/>
+          </a:ln>
+          <a:extLst>
+            <a:ext uri="{C572A759-6A51-4108-AA02-DFA0A04FC94B}">
+              <ma14:wrappingTextBoxFlag xmlns:ma14="http://schemas.microsoft.com/office/mac/drawingml/2011/main" xmlns="" val="1"/>
+            </a:ext>
+          </a:extLst>
+        </p:spPr>
+        <p:txBody>
+          <a:bodyPr wrap="none" lIns="50800" tIns="50800" rIns="50800" bIns="50800" anchor="ctr">
+            <a:spAutoFit/>
+          </a:bodyPr>
+          <a:lstStyle/>
+          <a:p>
+            <a:pPr lvl="0">
+              <a:defRPr sz="1800"/>
+            </a:pPr>
+            <a:r>
+              <a:rPr sz="2400"/>
+              <a:t>Transition</a:t>
+            </a:r>
+          </a:p>
+          <a:p>
+            <a:pPr lvl="0">
+              <a:defRPr sz="1800"/>
+            </a:pPr>
+            <a:r>
+              <a:rPr sz="2400"/>
+              <a:t>Probabilities</a:t>
+            </a:r>
+          </a:p>
+        </p:txBody>
+      </p:sp>
+      <p:sp>
+        <p:nvSpPr>
+          <p:cNvPr id="62" name="Shape 62"/>
+          <p:cNvSpPr/>
+          <p:nvPr/>
+        </p:nvSpPr>
+        <p:spPr>
+          <a:xfrm>
+            <a:off x="9833683" y="1672984"/>
+            <a:ext cx="1" cy="647701"/>
+          </a:xfrm>
+          <a:prstGeom prst="line">
+            <a:avLst/>
+          </a:prstGeom>
+          <a:ln w="12700">
+            <a:solidFill/>
+            <a:miter lim="400000"/>
+            <a:tailEnd type="triangle"/>
+          </a:ln>
+        </p:spPr>
+        <p:txBody>
+          <a:bodyPr lIns="0" tIns="0" rIns="0" bIns="0"/>
+          <a:lstStyle/>
+          <a:p>
+            <a:pPr lvl="0">
+              <a:defRPr sz="3000">
+                <a:solidFill>
+                  <a:srgbClr val="FFFFFF"/>
+                </a:solidFill>
+                <a:effectLst>
+                  <a:outerShdw blurRad="38100" dist="12700" dir="5400000" rotWithShape="0">
+                    <a:srgbClr val="000000">
+                      <a:alpha val="50000"/>
+                    </a:srgbClr>
+                  </a:outerShdw>
+                </a:effectLst>
+                <a:latin typeface="Gill Sans"/>
+                <a:ea typeface="Gill Sans"/>
+                <a:cs typeface="Gill Sans"/>
+                <a:sym typeface="Gill Sans"/>
+              </a:defRPr>
+            </a:pPr>
+            <a:endParaRPr/>
+          </a:p>
+        </p:txBody>
+      </p:sp>
+      <p:sp>
+        <p:nvSpPr>
+          <p:cNvPr id="63" name="Shape 63"/>
+          <p:cNvSpPr/>
+          <p:nvPr/>
+        </p:nvSpPr>
+        <p:spPr>
+          <a:xfrm>
+            <a:off x="9833683" y="2600609"/>
+            <a:ext cx="1" cy="652203"/>
+          </a:xfrm>
+          <a:prstGeom prst="line">
+            <a:avLst/>
+          </a:prstGeom>
+          <a:ln w="50800">
+            <a:solidFill/>
+            <a:miter lim="400000"/>
+            <a:tailEnd type="triangle"/>
+          </a:ln>
+        </p:spPr>
+        <p:txBody>
+          <a:bodyPr lIns="0" tIns="0" rIns="0" bIns="0"/>
+          <a:lstStyle/>
+          <a:p>
+            <a:pPr lvl="0">
+              <a:defRPr sz="3000">
+                <a:solidFill>
+                  <a:srgbClr val="FFFFFF"/>
+                </a:solidFill>
+                <a:effectLst>
+                  <a:outerShdw blurRad="38100" dist="12700" dir="5400000" rotWithShape="0">
+                    <a:srgbClr val="000000">
+                      <a:alpha val="50000"/>
+                    </a:srgbClr>
+                  </a:outerShdw>
+                </a:effectLst>
+                <a:latin typeface="Gill Sans"/>
+                <a:ea typeface="Gill Sans"/>
+                <a:cs typeface="Gill Sans"/>
+                <a:sym typeface="Gill Sans"/>
+              </a:defRPr>
+            </a:pPr>
+            <a:endParaRPr/>
+          </a:p>
+        </p:txBody>
+      </p:sp>
+      <p:sp>
+        <p:nvSpPr>
+          <p:cNvPr id="64" name="Shape 64"/>
+          <p:cNvSpPr/>
+          <p:nvPr/>
+        </p:nvSpPr>
+        <p:spPr>
+          <a:xfrm>
+            <a:off x="10162381" y="2672245"/>
+            <a:ext cx="925374" cy="469901"/>
+          </a:xfrm>
+          <a:prstGeom prst="rect">
+            <a:avLst/>
+          </a:prstGeom>
+          <a:ln w="12700">
+            <a:miter lim="400000"/>
+          </a:ln>
+          <a:extLst>
+            <a:ext uri="{C572A759-6A51-4108-AA02-DFA0A04FC94B}">
+              <ma14:wrappingTextBoxFlag xmlns:ma14="http://schemas.microsoft.com/office/mac/drawingml/2011/main" xmlns="" val="1"/>
+            </a:ext>
+          </a:extLst>
+        </p:spPr>
+        <p:txBody>
+          <a:bodyPr wrap="none" lIns="50800" tIns="50800" rIns="50800" bIns="50800" anchor="ctr">
+            <a:spAutoFit/>
+          </a:bodyPr>
+          <a:lstStyle>
+            <a:lvl1pPr>
+              <a:defRPr sz="2400"/>
+            </a:lvl1pPr>
+          </a:lstStyle>
+          <a:p>
+            <a:pPr lvl="0">
+              <a:defRPr sz="1800"/>
+            </a:pPr>
+            <a:r>
+              <a:rPr sz="2400"/>
+              <a:t>p = .8</a:t>
+            </a:r>
+          </a:p>
+        </p:txBody>
+      </p:sp>
+      <p:sp>
+        <p:nvSpPr>
+          <p:cNvPr id="65" name="Shape 65"/>
+          <p:cNvSpPr/>
+          <p:nvPr/>
+        </p:nvSpPr>
+        <p:spPr>
+          <a:xfrm>
+            <a:off x="10185043" y="1714653"/>
+            <a:ext cx="880049" cy="471924"/>
+          </a:xfrm>
+          <a:prstGeom prst="rect">
+            <a:avLst/>
+          </a:prstGeom>
+          <a:ln w="12700">
+            <a:miter lim="400000"/>
+          </a:ln>
+          <a:extLst>
+            <a:ext uri="{C572A759-6A51-4108-AA02-DFA0A04FC94B}">
+              <ma14:wrappingTextBoxFlag xmlns:ma14="http://schemas.microsoft.com/office/mac/drawingml/2011/main" xmlns="" val="1"/>
+            </a:ext>
+          </a:extLst>
+        </p:spPr>
+        <p:txBody>
+          <a:bodyPr wrap="none" lIns="50800" tIns="50800" rIns="50800" bIns="50800" anchor="ctr">
+            <a:spAutoFit/>
+          </a:bodyPr>
+          <a:lstStyle>
+            <a:lvl1pPr>
+              <a:defRPr sz="2400"/>
+            </a:lvl1pPr>
+          </a:lstStyle>
+          <a:p>
+            <a:pPr lvl="0">
+              <a:defRPr sz="1800"/>
+            </a:pPr>
+            <a:r>
+              <a:rPr sz="2400" dirty="0"/>
+              <a:t>p = </a:t>
+            </a:r>
+            <a:r>
+              <a:rPr sz="2400" dirty="0" smtClean="0"/>
+              <a:t>.</a:t>
+            </a:r>
+            <a:r>
+              <a:rPr lang="en-US" sz="2400" dirty="0" smtClean="0"/>
+              <a:t>2</a:t>
+            </a:r>
+            <a:endParaRPr sz="2400" dirty="0"/>
+          </a:p>
+        </p:txBody>
+      </p:sp>
+      <p:sp>
+        <p:nvSpPr>
+          <p:cNvPr id="66" name="Shape 66"/>
+          <p:cNvSpPr/>
+          <p:nvPr/>
+        </p:nvSpPr>
+        <p:spPr>
+          <a:xfrm>
+            <a:off x="9833683" y="3547570"/>
+            <a:ext cx="1" cy="556261"/>
+          </a:xfrm>
+          <a:prstGeom prst="line">
+            <a:avLst/>
+          </a:prstGeom>
+          <a:ln w="76200">
+            <a:solidFill/>
+            <a:miter lim="400000"/>
+            <a:tailEnd type="triangle"/>
+          </a:ln>
+        </p:spPr>
+        <p:txBody>
+          <a:bodyPr lIns="0" tIns="0" rIns="0" bIns="0"/>
+          <a:lstStyle/>
+          <a:p>
+            <a:pPr lvl="0">
+              <a:defRPr sz="3000">
+                <a:solidFill>
+                  <a:srgbClr val="FFFFFF"/>
+                </a:solidFill>
+                <a:effectLst>
+                  <a:outerShdw blurRad="38100" dist="12700" dir="5400000" rotWithShape="0">
+                    <a:srgbClr val="000000">
+                      <a:alpha val="50000"/>
+                    </a:srgbClr>
+                  </a:outerShdw>
+                </a:effectLst>
+                <a:latin typeface="Gill Sans"/>
+                <a:ea typeface="Gill Sans"/>
+                <a:cs typeface="Gill Sans"/>
+                <a:sym typeface="Gill Sans"/>
+              </a:defRPr>
+            </a:pPr>
+            <a:endParaRPr/>
+          </a:p>
+        </p:txBody>
+      </p:sp>
+      <p:sp>
+        <p:nvSpPr>
+          <p:cNvPr id="67" name="Shape 67"/>
+          <p:cNvSpPr/>
+          <p:nvPr/>
+        </p:nvSpPr>
+        <p:spPr>
+          <a:xfrm>
+            <a:off x="10204748" y="3590750"/>
+            <a:ext cx="840639" cy="469901"/>
+          </a:xfrm>
+          <a:prstGeom prst="rect">
+            <a:avLst/>
+          </a:prstGeom>
+          <a:ln w="12700">
+            <a:miter lim="400000"/>
+          </a:ln>
+          <a:extLst>
+            <a:ext uri="{C572A759-6A51-4108-AA02-DFA0A04FC94B}">
+              <ma14:wrappingTextBoxFlag xmlns:ma14="http://schemas.microsoft.com/office/mac/drawingml/2011/main" xmlns="" val="1"/>
+            </a:ext>
+          </a:extLst>
+        </p:spPr>
+        <p:txBody>
+          <a:bodyPr wrap="none" lIns="50800" tIns="50800" rIns="50800" bIns="50800" anchor="ctr">
+            <a:spAutoFit/>
+          </a:bodyPr>
+          <a:lstStyle>
+            <a:lvl1pPr>
+              <a:defRPr sz="2400"/>
+            </a:lvl1pPr>
+          </a:lstStyle>
+          <a:p>
+            <a:pPr lvl="0">
+              <a:defRPr sz="1800"/>
+            </a:pPr>
+            <a:r>
+              <a:rPr sz="2400"/>
+              <a:t>p = 1</a:t>
+            </a:r>
+          </a:p>
+        </p:txBody>
+      </p:sp>
+      <p:sp>
+        <p:nvSpPr>
+          <p:cNvPr id="51" name="Shape 49"/>
+          <p:cNvSpPr/>
+          <p:nvPr/>
+        </p:nvSpPr>
+        <p:spPr>
+          <a:xfrm>
+            <a:off x="6159322" y="969194"/>
+            <a:ext cx="0" cy="1069781"/>
+          </a:xfrm>
+          <a:prstGeom prst="line">
+            <a:avLst/>
+          </a:prstGeom>
+          <a:ln w="50800">
+            <a:solidFill/>
+            <a:miter lim="400000"/>
+            <a:tailEnd type="triangle"/>
+          </a:ln>
+        </p:spPr>
+        <p:txBody>
+          <a:bodyPr lIns="0" tIns="0" rIns="0" bIns="0"/>
+          <a:lstStyle/>
+          <a:p>
+            <a:pPr lvl="0">
+              <a:defRPr sz="3000">
+                <a:solidFill>
+                  <a:srgbClr val="FFFFFF"/>
+                </a:solidFill>
+                <a:effectLst>
+                  <a:outerShdw blurRad="38100" dist="12700" dir="5400000" rotWithShape="0">
+                    <a:srgbClr val="000000">
+                      <a:alpha val="50000"/>
+                    </a:srgbClr>
+                  </a:outerShdw>
+                </a:effectLst>
+                <a:latin typeface="Gill Sans"/>
+                <a:ea typeface="Gill Sans"/>
+                <a:cs typeface="Gill Sans"/>
+                <a:sym typeface="Gill Sans"/>
+              </a:defRPr>
+            </a:pPr>
+            <a:endParaRPr/>
+          </a:p>
+        </p:txBody>
+      </p:sp>
+      <p:sp>
+        <p:nvSpPr>
+          <p:cNvPr id="52" name="Shape 46"/>
+          <p:cNvSpPr/>
+          <p:nvPr/>
+        </p:nvSpPr>
+        <p:spPr>
+          <a:xfrm>
+            <a:off x="4659213" y="2362200"/>
+            <a:ext cx="541815" cy="584775"/>
+          </a:xfrm>
+          <a:prstGeom prst="rect">
+            <a:avLst/>
+          </a:prstGeom>
+          <a:solidFill>
+            <a:srgbClr val="FFFFFF"/>
+          </a:solidFill>
+          <a:ln w="12700">
+            <a:miter lim="400000"/>
+          </a:ln>
+          <a:extLst>
+            <a:ext uri="{C572A759-6A51-4108-AA02-DFA0A04FC94B}">
+              <ma14:wrappingTextBoxFlag xmlns:ma14="http://schemas.microsoft.com/office/mac/drawingml/2011/main" xmlns="" val="1"/>
+            </a:ext>
+          </a:extLst>
+        </p:spPr>
+        <p:txBody>
+          <a:bodyPr wrap="none" lIns="0" tIns="0" rIns="0" bIns="0" anchor="ctr">
+            <a:spAutoFit/>
+          </a:bodyPr>
+          <a:lstStyle>
+            <a:lvl1pPr>
+              <a:defRPr sz="3800">
+                <a:latin typeface="Helvetica"/>
+                <a:ea typeface="Helvetica"/>
+                <a:cs typeface="Helvetica"/>
+                <a:sym typeface="Helvetica"/>
+              </a:defRPr>
+            </a:lvl1pPr>
+          </a:lstStyle>
+          <a:p>
+            <a:pPr lvl="0">
+              <a:defRPr sz="1800"/>
+            </a:pPr>
+            <a:r>
+              <a:rPr lang="en-US" sz="3800" dirty="0" smtClean="0"/>
+              <a:t>16</a:t>
+            </a:r>
+            <a:endParaRPr sz="3800" dirty="0"/>
+          </a:p>
+        </p:txBody>
+      </p:sp>
+      <p:sp>
+        <p:nvSpPr>
+          <p:cNvPr id="53" name="Shape 46"/>
+          <p:cNvSpPr/>
+          <p:nvPr/>
+        </p:nvSpPr>
+        <p:spPr>
+          <a:xfrm>
+            <a:off x="5918387" y="2362200"/>
+            <a:ext cx="541815" cy="584775"/>
+          </a:xfrm>
+          <a:prstGeom prst="rect">
+            <a:avLst/>
+          </a:prstGeom>
+          <a:solidFill>
+            <a:srgbClr val="FFFFFF"/>
+          </a:solidFill>
+          <a:ln w="12700">
+            <a:miter lim="400000"/>
+          </a:ln>
+          <a:extLst>
+            <a:ext uri="{C572A759-6A51-4108-AA02-DFA0A04FC94B}">
+              <ma14:wrappingTextBoxFlag xmlns:ma14="http://schemas.microsoft.com/office/mac/drawingml/2011/main" xmlns="" val="1"/>
+            </a:ext>
+          </a:extLst>
+        </p:spPr>
+        <p:txBody>
+          <a:bodyPr wrap="none" lIns="0" tIns="0" rIns="0" bIns="0" anchor="ctr">
+            <a:spAutoFit/>
+          </a:bodyPr>
+          <a:lstStyle>
+            <a:lvl1pPr>
+              <a:defRPr sz="3800">
+                <a:latin typeface="Helvetica"/>
+                <a:ea typeface="Helvetica"/>
+                <a:cs typeface="Helvetica"/>
+                <a:sym typeface="Helvetica"/>
+              </a:defRPr>
+            </a:lvl1pPr>
+          </a:lstStyle>
+          <a:p>
+            <a:pPr lvl="0">
+              <a:defRPr sz="1800"/>
+            </a:pPr>
+            <a:r>
+              <a:rPr lang="en-US" sz="3800" dirty="0" smtClean="0"/>
+              <a:t>21</a:t>
+            </a:r>
+            <a:endParaRPr sz="3800" dirty="0"/>
+          </a:p>
+        </p:txBody>
+      </p:sp>
+      <p:sp>
+        <p:nvSpPr>
+          <p:cNvPr id="69" name="Shape 46"/>
+          <p:cNvSpPr/>
+          <p:nvPr/>
+        </p:nvSpPr>
+        <p:spPr>
+          <a:xfrm>
+            <a:off x="8153438" y="2362200"/>
+            <a:ext cx="270908" cy="584775"/>
+          </a:xfrm>
+          <a:prstGeom prst="rect">
+            <a:avLst/>
+          </a:prstGeom>
+          <a:solidFill>
+            <a:srgbClr val="FFFFFF"/>
+          </a:solidFill>
+          <a:ln w="12700">
+            <a:miter lim="400000"/>
+          </a:ln>
+          <a:extLst>
+            <a:ext uri="{C572A759-6A51-4108-AA02-DFA0A04FC94B}">
+              <ma14:wrappingTextBoxFlag xmlns:ma14="http://schemas.microsoft.com/office/mac/drawingml/2011/main" xmlns="" val="1"/>
+            </a:ext>
+          </a:extLst>
+        </p:spPr>
+        <p:txBody>
+          <a:bodyPr wrap="none" lIns="0" tIns="0" rIns="0" bIns="0" anchor="ctr">
+            <a:spAutoFit/>
+          </a:bodyPr>
+          <a:lstStyle>
+            <a:lvl1pPr>
+              <a:defRPr sz="3800">
+                <a:latin typeface="Helvetica"/>
+                <a:ea typeface="Helvetica"/>
+                <a:cs typeface="Helvetica"/>
+                <a:sym typeface="Helvetica"/>
+              </a:defRPr>
+            </a:lvl1pPr>
+          </a:lstStyle>
+          <a:p>
+            <a:pPr lvl="0">
+              <a:defRPr sz="1800"/>
+            </a:pPr>
+            <a:r>
+              <a:rPr lang="en-US" sz="3800" dirty="0" smtClean="0"/>
+              <a:t>0</a:t>
+            </a:r>
+            <a:endParaRPr sz="3800" dirty="0"/>
+          </a:p>
+        </p:txBody>
+      </p:sp>
+    </p:spTree>
+    <p:extLst>
+      <p:ext uri="{BB962C8B-B14F-4D97-AF65-F5344CB8AC3E}">
+        <p14:creationId xmlns:p14="http://schemas.microsoft.com/office/powerpoint/2010/main" val="1145352593"/>
+      </p:ext>
+    </p:extLst>
+  </p:cSld>
+  <p:clrMapOvr>
+    <a:masterClrMapping/>
+  </p:clrMapOvr>
+  <p:transition spd="med"/>
+</p:sld>
+</file>
+
+<file path=ppt/slides/slide13.xml><?xml version="1.0" encoding="utf-8"?>
+<p:sld xmlns:a="http://schemas.openxmlformats.org/drawingml/2006/main" xmlns:r="http://schemas.openxmlformats.org/officeDocument/2006/relationships" xmlns:p="http://schemas.openxmlformats.org/presentationml/2006/main">
+  <p:cSld>
+    <p:spTree>
+      <p:nvGrpSpPr>
+        <p:cNvPr id="1" name=""/>
+        <p:cNvGrpSpPr/>
+        <p:nvPr/>
+      </p:nvGrpSpPr>
+      <p:grpSpPr>
+        <a:xfrm>
+          <a:off x="0" y="0"/>
+          <a:ext cx="0" cy="0"/>
+          <a:chOff x="0" y="0"/>
+          <a:chExt cx="0" cy="0"/>
+        </a:xfrm>
+      </p:grpSpPr>
+      <p:grpSp>
+        <p:nvGrpSpPr>
+          <p:cNvPr id="7" name="Group 6"/>
+          <p:cNvGrpSpPr/>
+          <p:nvPr/>
+        </p:nvGrpSpPr>
+        <p:grpSpPr>
+          <a:xfrm>
+            <a:off x="1459342" y="152400"/>
+            <a:ext cx="10271739" cy="6049142"/>
+            <a:chOff x="1459342" y="152400"/>
+            <a:chExt cx="10271739" cy="6049142"/>
+          </a:xfrm>
+        </p:grpSpPr>
+        <p:sp>
+          <p:nvSpPr>
+            <p:cNvPr id="32" name="Shape 32"/>
+            <p:cNvSpPr/>
+            <p:nvPr/>
+          </p:nvSpPr>
+          <p:spPr>
+            <a:xfrm>
+              <a:off x="3911600" y="5599565"/>
+              <a:ext cx="778613" cy="556261"/>
+            </a:xfrm>
+            <a:prstGeom prst="rect">
+              <a:avLst/>
+            </a:prstGeom>
+            <a:ln w="12700">
+              <a:solidFill>
+                <a:schemeClr val="accent1"/>
+              </a:solidFill>
+              <a:miter lim="400000"/>
+            </a:ln>
+            <a:extLst>
+              <a:ext uri="{C572A759-6A51-4108-AA02-DFA0A04FC94B}">
+                <ma14:wrappingTextBoxFlag xmlns:ma14="http://schemas.microsoft.com/office/mac/drawingml/2011/main" xmlns="" val="1"/>
+              </a:ext>
+            </a:extLst>
+          </p:spPr>
+          <p:txBody>
+            <a:bodyPr wrap="none" lIns="0" tIns="0" rIns="0" bIns="0" anchor="ctr">
+              <a:spAutoFit/>
+            </a:bodyPr>
+            <a:lstStyle/>
+            <a:p>
+              <a:pPr lvl="0">
+                <a:defRPr sz="1800"/>
+              </a:pPr>
+              <a:r>
+                <a:rPr sz="3600" dirty="0">
+                  <a:solidFill>
+                    <a:srgbClr val="51A7F9"/>
+                  </a:solidFill>
+                  <a:latin typeface="Whitney Medium"/>
+                  <a:ea typeface="Whitney Medium"/>
+                  <a:cs typeface="Whitney Medium"/>
+                  <a:sym typeface="Whitney Medium"/>
+                </a:rPr>
+                <a:t>$</a:t>
+              </a:r>
+              <a:r>
+                <a:rPr sz="3600" dirty="0" smtClean="0">
+                  <a:solidFill>
+                    <a:srgbClr val="51A7F9"/>
+                  </a:solidFill>
+                  <a:latin typeface="Whitney Medium"/>
+                  <a:ea typeface="Whitney Medium"/>
+                  <a:cs typeface="Whitney Medium"/>
+                  <a:sym typeface="Whitney Medium"/>
+                </a:rPr>
+                <a:t>R</a:t>
+              </a:r>
+              <a:r>
+                <a:rPr lang="en-US" sz="3600" baseline="-5999" dirty="0" smtClean="0">
+                  <a:solidFill>
+                    <a:srgbClr val="51A7F9"/>
+                  </a:solidFill>
+                  <a:latin typeface="Whitney Medium"/>
+                  <a:ea typeface="Whitney Medium"/>
+                  <a:cs typeface="Whitney Medium"/>
+                  <a:sym typeface="Whitney Medium"/>
+                </a:rPr>
+                <a:t>1</a:t>
+              </a:r>
+              <a:endParaRPr sz="3600" baseline="-5999" dirty="0">
+                <a:solidFill>
+                  <a:srgbClr val="51A7F9"/>
+                </a:solidFill>
+                <a:latin typeface="Whitney Medium"/>
+                <a:ea typeface="Whitney Medium"/>
+                <a:cs typeface="Whitney Medium"/>
+                <a:sym typeface="Whitney Medium"/>
+              </a:endParaRPr>
+            </a:p>
+          </p:txBody>
+        </p:sp>
+        <p:sp>
+          <p:nvSpPr>
+            <p:cNvPr id="37" name="Shape 37"/>
+            <p:cNvSpPr/>
+            <p:nvPr/>
+          </p:nvSpPr>
+          <p:spPr>
+            <a:xfrm>
+              <a:off x="4595365" y="3048000"/>
+              <a:ext cx="687835" cy="687835"/>
+            </a:xfrm>
+            <a:prstGeom prst="rect">
+              <a:avLst/>
+            </a:prstGeom>
+            <a:solidFill>
+              <a:srgbClr val="51A7F9"/>
+            </a:solidFill>
+            <a:ln w="12700">
+              <a:miter lim="400000"/>
+            </a:ln>
+          </p:spPr>
+          <p:txBody>
+            <a:bodyPr lIns="0" tIns="0" rIns="0" bIns="0" anchor="ctr"/>
+            <a:lstStyle/>
+            <a:p>
+              <a:pPr lvl="0">
+                <a:defRPr sz="3000">
+                  <a:solidFill>
+                    <a:srgbClr val="FFFFFF"/>
+                  </a:solidFill>
+                  <a:effectLst>
+                    <a:outerShdw blurRad="38100" dist="12700" dir="5400000" rotWithShape="0">
+                      <a:srgbClr val="000000">
+                        <a:alpha val="50000"/>
+                      </a:srgbClr>
+                    </a:outerShdw>
+                  </a:effectLst>
+                  <a:latin typeface="Whitney Medium"/>
+                  <a:ea typeface="Whitney Medium"/>
+                  <a:cs typeface="Whitney Medium"/>
+                  <a:sym typeface="Whitney Medium"/>
+                </a:defRPr>
+              </a:pPr>
+              <a:r>
+                <a:rPr lang="en-US" dirty="0" smtClean="0"/>
+                <a:t>b</a:t>
+              </a:r>
+              <a:endParaRPr dirty="0"/>
+            </a:p>
+          </p:txBody>
+        </p:sp>
+        <p:sp>
+          <p:nvSpPr>
+            <p:cNvPr id="39" name="Shape 39"/>
+            <p:cNvSpPr/>
+            <p:nvPr/>
+          </p:nvSpPr>
+          <p:spPr>
+            <a:xfrm>
+              <a:off x="4939283" y="877176"/>
+              <a:ext cx="3201596" cy="1827628"/>
+            </a:xfrm>
+            <a:prstGeom prst="line">
+              <a:avLst/>
+            </a:prstGeom>
+            <a:ln w="12700">
+              <a:solidFill/>
+              <a:miter lim="400000"/>
+              <a:tailEnd type="triangle"/>
+            </a:ln>
+          </p:spPr>
+          <p:txBody>
+            <a:bodyPr lIns="0" tIns="0" rIns="0" bIns="0"/>
+            <a:lstStyle/>
+            <a:p>
+              <a:pPr lvl="0">
+                <a:defRPr sz="3000">
+                  <a:solidFill>
+                    <a:srgbClr val="FFFFFF"/>
+                  </a:solidFill>
+                  <a:effectLst>
+                    <a:outerShdw blurRad="38100" dist="12700" dir="5400000" rotWithShape="0">
+                      <a:srgbClr val="000000">
+                        <a:alpha val="50000"/>
+                      </a:srgbClr>
+                    </a:outerShdw>
+                  </a:effectLst>
+                  <a:latin typeface="Gill Sans"/>
+                  <a:ea typeface="Gill Sans"/>
+                  <a:cs typeface="Gill Sans"/>
+                  <a:sym typeface="Gill Sans"/>
+                </a:defRPr>
+              </a:pPr>
+              <a:endParaRPr/>
+            </a:p>
+          </p:txBody>
+        </p:sp>
+        <p:sp>
+          <p:nvSpPr>
+            <p:cNvPr id="40" name="Shape 40"/>
+            <p:cNvSpPr/>
+            <p:nvPr/>
+          </p:nvSpPr>
+          <p:spPr>
+            <a:xfrm>
+              <a:off x="5478526" y="854508"/>
+              <a:ext cx="2662352" cy="1850296"/>
+            </a:xfrm>
+            <a:prstGeom prst="line">
+              <a:avLst/>
+            </a:prstGeom>
+            <a:ln w="12700">
+              <a:solidFill/>
+              <a:miter lim="400000"/>
+              <a:tailEnd type="triangle"/>
+            </a:ln>
+          </p:spPr>
+          <p:txBody>
+            <a:bodyPr lIns="0" tIns="0" rIns="0" bIns="0"/>
+            <a:lstStyle/>
+            <a:p>
+              <a:pPr lvl="0">
+                <a:defRPr sz="3000">
+                  <a:solidFill>
+                    <a:srgbClr val="FFFFFF"/>
+                  </a:solidFill>
+                  <a:effectLst>
+                    <a:outerShdw blurRad="38100" dist="12700" dir="5400000" rotWithShape="0">
+                      <a:srgbClr val="000000">
+                        <a:alpha val="50000"/>
+                      </a:srgbClr>
+                    </a:outerShdw>
+                  </a:effectLst>
+                  <a:latin typeface="Gill Sans"/>
+                  <a:ea typeface="Gill Sans"/>
+                  <a:cs typeface="Gill Sans"/>
+                  <a:sym typeface="Gill Sans"/>
+                </a:defRPr>
+              </a:pPr>
+              <a:endParaRPr/>
+            </a:p>
+          </p:txBody>
+        </p:sp>
+        <p:sp>
+          <p:nvSpPr>
+            <p:cNvPr id="41" name="Shape 41"/>
+            <p:cNvSpPr/>
+            <p:nvPr/>
+          </p:nvSpPr>
+          <p:spPr>
+            <a:xfrm>
+              <a:off x="6104455" y="876300"/>
+              <a:ext cx="2036424" cy="1828504"/>
+            </a:xfrm>
+            <a:prstGeom prst="line">
+              <a:avLst/>
+            </a:prstGeom>
+            <a:ln w="12700">
+              <a:solidFill/>
+              <a:miter lim="400000"/>
+              <a:tailEnd type="triangle"/>
+            </a:ln>
+          </p:spPr>
+          <p:txBody>
+            <a:bodyPr lIns="0" tIns="0" rIns="0" bIns="0"/>
+            <a:lstStyle/>
+            <a:p>
+              <a:pPr lvl="0">
+                <a:defRPr sz="3000">
+                  <a:solidFill>
+                    <a:srgbClr val="FFFFFF"/>
+                  </a:solidFill>
+                  <a:effectLst>
+                    <a:outerShdw blurRad="38100" dist="12700" dir="5400000" rotWithShape="0">
+                      <a:srgbClr val="000000">
+                        <a:alpha val="50000"/>
+                      </a:srgbClr>
+                    </a:outerShdw>
+                  </a:effectLst>
+                  <a:latin typeface="Gill Sans"/>
+                  <a:ea typeface="Gill Sans"/>
+                  <a:cs typeface="Gill Sans"/>
+                  <a:sym typeface="Gill Sans"/>
+                </a:defRPr>
+              </a:pPr>
+              <a:endParaRPr/>
+            </a:p>
+          </p:txBody>
+        </p:sp>
+        <p:sp>
+          <p:nvSpPr>
+            <p:cNvPr id="42" name="Shape 42"/>
+            <p:cNvSpPr/>
+            <p:nvPr/>
+          </p:nvSpPr>
+          <p:spPr>
+            <a:xfrm>
+              <a:off x="6713518" y="877176"/>
+              <a:ext cx="1427360" cy="1827628"/>
+            </a:xfrm>
+            <a:prstGeom prst="line">
+              <a:avLst/>
+            </a:prstGeom>
+            <a:ln w="12700">
+              <a:solidFill/>
+              <a:miter lim="400000"/>
+              <a:tailEnd type="triangle"/>
+            </a:ln>
+          </p:spPr>
+          <p:txBody>
+            <a:bodyPr lIns="0" tIns="0" rIns="0" bIns="0"/>
+            <a:lstStyle/>
+            <a:p>
+              <a:pPr lvl="0">
+                <a:defRPr sz="3000">
+                  <a:solidFill>
+                    <a:srgbClr val="FFFFFF"/>
+                  </a:solidFill>
+                  <a:effectLst>
+                    <a:outerShdw blurRad="38100" dist="12700" dir="5400000" rotWithShape="0">
+                      <a:srgbClr val="000000">
+                        <a:alpha val="50000"/>
+                      </a:srgbClr>
+                    </a:outerShdw>
+                  </a:effectLst>
+                  <a:latin typeface="Gill Sans"/>
+                  <a:ea typeface="Gill Sans"/>
+                  <a:cs typeface="Gill Sans"/>
+                  <a:sym typeface="Gill Sans"/>
+                </a:defRPr>
+              </a:pPr>
+              <a:endParaRPr/>
+            </a:p>
+          </p:txBody>
+        </p:sp>
+        <p:sp>
+          <p:nvSpPr>
+            <p:cNvPr id="43" name="Shape 43"/>
+            <p:cNvSpPr/>
+            <p:nvPr/>
+          </p:nvSpPr>
+          <p:spPr>
+            <a:xfrm>
+              <a:off x="5393292" y="253425"/>
+              <a:ext cx="270908" cy="584775"/>
+            </a:xfrm>
+            <a:prstGeom prst="rect">
+              <a:avLst/>
+            </a:prstGeom>
+            <a:solidFill>
+              <a:srgbClr val="FFFFFF"/>
+            </a:solidFill>
+            <a:ln w="12700">
+              <a:miter lim="400000"/>
+            </a:ln>
+            <a:extLst>
+              <a:ext uri="{C572A759-6A51-4108-AA02-DFA0A04FC94B}">
+                <ma14:wrappingTextBoxFlag xmlns:ma14="http://schemas.microsoft.com/office/mac/drawingml/2011/main" xmlns="" val="1"/>
+              </a:ext>
+            </a:extLst>
+          </p:spPr>
+          <p:txBody>
+            <a:bodyPr wrap="none" lIns="0" tIns="0" rIns="0" bIns="0" anchor="ctr">
+              <a:spAutoFit/>
+            </a:bodyPr>
+            <a:lstStyle>
+              <a:lvl1pPr>
+                <a:defRPr sz="3800">
+                  <a:latin typeface="Helvetica"/>
+                  <a:ea typeface="Helvetica"/>
+                  <a:cs typeface="Helvetica"/>
+                  <a:sym typeface="Helvetica"/>
+                </a:defRPr>
+              </a:lvl1pPr>
+            </a:lstStyle>
+            <a:p>
+              <a:pPr lvl="0">
+                <a:defRPr sz="1800"/>
+              </a:pPr>
+              <a:r>
+                <a:rPr lang="en-US" sz="3800" dirty="0" smtClean="0"/>
+                <a:t>2</a:t>
+              </a:r>
+              <a:endParaRPr sz="3800" dirty="0"/>
+            </a:p>
+          </p:txBody>
+        </p:sp>
+        <p:sp>
+          <p:nvSpPr>
+            <p:cNvPr id="44" name="Shape 44"/>
+            <p:cNvSpPr/>
+            <p:nvPr/>
+          </p:nvSpPr>
+          <p:spPr>
+            <a:xfrm>
+              <a:off x="6612492" y="253425"/>
+              <a:ext cx="270908" cy="584775"/>
+            </a:xfrm>
+            <a:prstGeom prst="rect">
+              <a:avLst/>
+            </a:prstGeom>
+            <a:solidFill>
+              <a:srgbClr val="FFFFFF"/>
+            </a:solidFill>
+            <a:ln w="12700">
+              <a:miter lim="400000"/>
+            </a:ln>
+            <a:extLst>
+              <a:ext uri="{C572A759-6A51-4108-AA02-DFA0A04FC94B}">
+                <ma14:wrappingTextBoxFlag xmlns:ma14="http://schemas.microsoft.com/office/mac/drawingml/2011/main" xmlns="" val="1"/>
+              </a:ext>
+            </a:extLst>
+          </p:spPr>
+          <p:txBody>
+            <a:bodyPr wrap="none" lIns="0" tIns="0" rIns="0" bIns="0" anchor="ctr">
+              <a:spAutoFit/>
+            </a:bodyPr>
+            <a:lstStyle>
+              <a:lvl1pPr>
+                <a:defRPr sz="3800">
+                  <a:latin typeface="Helvetica"/>
+                  <a:ea typeface="Helvetica"/>
+                  <a:cs typeface="Helvetica"/>
+                  <a:sym typeface="Helvetica"/>
+                </a:defRPr>
+              </a:lvl1pPr>
+            </a:lstStyle>
+            <a:p>
+              <a:pPr lvl="0">
+                <a:defRPr sz="1800"/>
+              </a:pPr>
+              <a:r>
+                <a:rPr lang="en-US" sz="3800" dirty="0" smtClean="0"/>
+                <a:t>4</a:t>
+              </a:r>
+              <a:endParaRPr sz="3800" dirty="0"/>
+            </a:p>
+          </p:txBody>
+        </p:sp>
+        <p:sp>
+          <p:nvSpPr>
+            <p:cNvPr id="45" name="Shape 45"/>
+            <p:cNvSpPr/>
+            <p:nvPr/>
+          </p:nvSpPr>
+          <p:spPr>
+            <a:xfrm>
+              <a:off x="5477908" y="876300"/>
+              <a:ext cx="1220948" cy="1804040"/>
+            </a:xfrm>
+            <a:prstGeom prst="line">
+              <a:avLst/>
+            </a:prstGeom>
+            <a:ln w="50800">
+              <a:solidFill/>
+              <a:miter lim="400000"/>
+              <a:tailEnd type="triangle"/>
+            </a:ln>
+          </p:spPr>
+          <p:txBody>
+            <a:bodyPr lIns="0" tIns="0" rIns="0" bIns="0"/>
+            <a:lstStyle/>
+            <a:p>
+              <a:pPr lvl="0">
+                <a:defRPr sz="3000">
+                  <a:solidFill>
+                    <a:srgbClr val="FFFFFF"/>
+                  </a:solidFill>
+                  <a:effectLst>
+                    <a:outerShdw blurRad="38100" dist="12700" dir="5400000" rotWithShape="0">
+                      <a:srgbClr val="000000">
+                        <a:alpha val="50000"/>
+                      </a:srgbClr>
+                    </a:outerShdw>
+                  </a:effectLst>
+                  <a:latin typeface="Gill Sans"/>
+                  <a:ea typeface="Gill Sans"/>
+                  <a:cs typeface="Gill Sans"/>
+                  <a:sym typeface="Gill Sans"/>
+                </a:defRPr>
+              </a:pPr>
+              <a:endParaRPr/>
+            </a:p>
+          </p:txBody>
+        </p:sp>
+        <p:sp>
+          <p:nvSpPr>
+            <p:cNvPr id="46" name="Shape 46"/>
+            <p:cNvSpPr/>
+            <p:nvPr/>
+          </p:nvSpPr>
+          <p:spPr>
+            <a:xfrm>
+              <a:off x="4749800" y="253425"/>
+              <a:ext cx="270908" cy="584775"/>
+            </a:xfrm>
+            <a:prstGeom prst="rect">
+              <a:avLst/>
+            </a:prstGeom>
+            <a:solidFill>
+              <a:srgbClr val="FFFFFF"/>
+            </a:solidFill>
+            <a:ln w="12700">
+              <a:miter lim="400000"/>
+            </a:ln>
+            <a:extLst>
+              <a:ext uri="{C572A759-6A51-4108-AA02-DFA0A04FC94B}">
+                <ma14:wrappingTextBoxFlag xmlns:ma14="http://schemas.microsoft.com/office/mac/drawingml/2011/main" xmlns="" val="1"/>
+              </a:ext>
+            </a:extLst>
+          </p:spPr>
+          <p:txBody>
+            <a:bodyPr wrap="none" lIns="0" tIns="0" rIns="0" bIns="0" anchor="ctr">
+              <a:spAutoFit/>
+            </a:bodyPr>
+            <a:lstStyle>
+              <a:lvl1pPr>
+                <a:defRPr sz="3800">
+                  <a:latin typeface="Helvetica"/>
+                  <a:ea typeface="Helvetica"/>
+                  <a:cs typeface="Helvetica"/>
+                  <a:sym typeface="Helvetica"/>
+                </a:defRPr>
+              </a:lvl1pPr>
+            </a:lstStyle>
+            <a:p>
+              <a:pPr lvl="0">
+                <a:defRPr sz="1800"/>
+              </a:pPr>
+              <a:r>
+                <a:rPr lang="en-US" sz="3800" dirty="0" smtClean="0"/>
+                <a:t>1</a:t>
+              </a:r>
+              <a:endParaRPr sz="3800" dirty="0"/>
+            </a:p>
+          </p:txBody>
+        </p:sp>
+        <p:sp>
+          <p:nvSpPr>
+            <p:cNvPr id="47" name="Shape 47"/>
+            <p:cNvSpPr/>
+            <p:nvPr/>
+          </p:nvSpPr>
+          <p:spPr>
+            <a:xfrm>
+              <a:off x="5969000" y="253425"/>
+              <a:ext cx="270908" cy="584775"/>
+            </a:xfrm>
+            <a:prstGeom prst="rect">
+              <a:avLst/>
+            </a:prstGeom>
+            <a:solidFill>
+              <a:srgbClr val="FFFFFF"/>
+            </a:solidFill>
+            <a:ln w="12700">
+              <a:miter lim="400000"/>
+            </a:ln>
+            <a:extLst>
+              <a:ext uri="{C572A759-6A51-4108-AA02-DFA0A04FC94B}">
+                <ma14:wrappingTextBoxFlag xmlns:ma14="http://schemas.microsoft.com/office/mac/drawingml/2011/main" xmlns="" val="1"/>
+              </a:ext>
+            </a:extLst>
+          </p:spPr>
+          <p:txBody>
+            <a:bodyPr wrap="none" lIns="0" tIns="0" rIns="0" bIns="0" anchor="ctr">
+              <a:spAutoFit/>
+            </a:bodyPr>
+            <a:lstStyle>
+              <a:lvl1pPr>
+                <a:defRPr sz="3800">
+                  <a:latin typeface="Helvetica"/>
+                  <a:ea typeface="Helvetica"/>
+                  <a:cs typeface="Helvetica"/>
+                  <a:sym typeface="Helvetica"/>
+                </a:defRPr>
+              </a:lvl1pPr>
+            </a:lstStyle>
+            <a:p>
+              <a:pPr lvl="0">
+                <a:defRPr sz="1800"/>
+              </a:pPr>
+              <a:r>
+                <a:rPr lang="en-US" sz="3800" dirty="0" smtClean="0"/>
+                <a:t>3</a:t>
+              </a:r>
+              <a:endParaRPr sz="3800" dirty="0"/>
+            </a:p>
+          </p:txBody>
+        </p:sp>
+        <p:sp>
+          <p:nvSpPr>
+            <p:cNvPr id="48" name="Shape 48"/>
+            <p:cNvSpPr/>
+            <p:nvPr/>
+          </p:nvSpPr>
+          <p:spPr>
+            <a:xfrm flipH="1">
+              <a:off x="6713518" y="838200"/>
+              <a:ext cx="0" cy="1864733"/>
+            </a:xfrm>
+            <a:prstGeom prst="line">
+              <a:avLst/>
+            </a:prstGeom>
+            <a:ln w="50800">
+              <a:solidFill/>
+              <a:miter lim="400000"/>
+              <a:tailEnd type="triangle"/>
+            </a:ln>
+          </p:spPr>
+          <p:txBody>
+            <a:bodyPr lIns="0" tIns="0" rIns="0" bIns="0"/>
+            <a:lstStyle/>
+            <a:p>
+              <a:pPr lvl="0">
+                <a:defRPr sz="3000">
+                  <a:solidFill>
+                    <a:srgbClr val="FFFFFF"/>
+                  </a:solidFill>
+                  <a:effectLst>
+                    <a:outerShdw blurRad="38100" dist="12700" dir="5400000" rotWithShape="0">
+                      <a:srgbClr val="000000">
+                        <a:alpha val="50000"/>
+                      </a:srgbClr>
+                    </a:outerShdw>
+                  </a:effectLst>
+                  <a:latin typeface="Gill Sans"/>
+                  <a:ea typeface="Gill Sans"/>
+                  <a:cs typeface="Gill Sans"/>
+                  <a:sym typeface="Gill Sans"/>
+                </a:defRPr>
+              </a:pPr>
+              <a:endParaRPr/>
+            </a:p>
+          </p:txBody>
+        </p:sp>
+        <p:sp>
+          <p:nvSpPr>
+            <p:cNvPr id="49" name="Shape 49"/>
+            <p:cNvSpPr/>
+            <p:nvPr/>
+          </p:nvSpPr>
+          <p:spPr>
+            <a:xfrm>
+              <a:off x="4868671" y="876300"/>
+              <a:ext cx="0" cy="1804040"/>
+            </a:xfrm>
+            <a:prstGeom prst="line">
+              <a:avLst/>
+            </a:prstGeom>
+            <a:ln w="50800">
+              <a:solidFill/>
+              <a:miter lim="400000"/>
+              <a:tailEnd type="triangle"/>
+            </a:ln>
+          </p:spPr>
+          <p:txBody>
+            <a:bodyPr lIns="0" tIns="0" rIns="0" bIns="0"/>
+            <a:lstStyle/>
+            <a:p>
+              <a:pPr lvl="0">
+                <a:defRPr sz="3000">
+                  <a:solidFill>
+                    <a:srgbClr val="FFFFFF"/>
+                  </a:solidFill>
+                  <a:effectLst>
+                    <a:outerShdw blurRad="38100" dist="12700" dir="5400000" rotWithShape="0">
+                      <a:srgbClr val="000000">
+                        <a:alpha val="50000"/>
+                      </a:srgbClr>
+                    </a:outerShdw>
+                  </a:effectLst>
+                  <a:latin typeface="Gill Sans"/>
+                  <a:ea typeface="Gill Sans"/>
+                  <a:cs typeface="Gill Sans"/>
+                  <a:sym typeface="Gill Sans"/>
+                </a:defRPr>
+              </a:pPr>
+              <a:endParaRPr/>
+            </a:p>
+          </p:txBody>
+        </p:sp>
+        <p:sp>
+          <p:nvSpPr>
+            <p:cNvPr id="50" name="Shape 50"/>
+            <p:cNvSpPr/>
+            <p:nvPr/>
+          </p:nvSpPr>
+          <p:spPr>
+            <a:xfrm flipH="1">
+              <a:off x="4868670" y="838200"/>
+              <a:ext cx="1219712" cy="1828800"/>
+            </a:xfrm>
+            <a:prstGeom prst="line">
+              <a:avLst/>
+            </a:prstGeom>
+            <a:ln w="50800">
+              <a:solidFill/>
+              <a:miter lim="400000"/>
+              <a:tailEnd type="triangle"/>
+            </a:ln>
+          </p:spPr>
+          <p:txBody>
+            <a:bodyPr lIns="0" tIns="0" rIns="0" bIns="0"/>
+            <a:lstStyle/>
+            <a:p>
+              <a:pPr lvl="0">
+                <a:defRPr sz="3000">
+                  <a:solidFill>
+                    <a:srgbClr val="FFFFFF"/>
+                  </a:solidFill>
+                  <a:effectLst>
+                    <a:outerShdw blurRad="38100" dist="12700" dir="5400000" rotWithShape="0">
+                      <a:srgbClr val="000000">
+                        <a:alpha val="50000"/>
+                      </a:srgbClr>
+                    </a:outerShdw>
+                  </a:effectLst>
+                  <a:latin typeface="Gill Sans"/>
+                  <a:ea typeface="Gill Sans"/>
+                  <a:cs typeface="Gill Sans"/>
+                  <a:sym typeface="Gill Sans"/>
+                </a:defRPr>
+              </a:pPr>
+              <a:endParaRPr/>
+            </a:p>
+          </p:txBody>
+        </p:sp>
+        <p:sp>
+          <p:nvSpPr>
+            <p:cNvPr id="55" name="Shape 55"/>
+            <p:cNvSpPr/>
+            <p:nvPr/>
+          </p:nvSpPr>
+          <p:spPr>
+            <a:xfrm>
+              <a:off x="7711083" y="5599563"/>
+              <a:ext cx="772517" cy="556261"/>
+            </a:xfrm>
+            <a:prstGeom prst="rect">
+              <a:avLst/>
+            </a:prstGeom>
+            <a:ln/>
+            <a:extLst>
+              <a:ext uri="{C572A759-6A51-4108-AA02-DFA0A04FC94B}">
+                <ma14:wrappingTextBoxFlag xmlns:ma14="http://schemas.microsoft.com/office/mac/drawingml/2011/main" xmlns="" val="1"/>
+              </a:ext>
+            </a:extLst>
+          </p:spPr>
+          <p:style>
+            <a:lnRef idx="2">
+              <a:schemeClr val="accent2"/>
+            </a:lnRef>
+            <a:fillRef idx="1">
+              <a:schemeClr val="lt1"/>
+            </a:fillRef>
+            <a:effectRef idx="0">
+              <a:schemeClr val="accent2"/>
+            </a:effectRef>
+            <a:fontRef idx="minor">
+              <a:schemeClr val="dk1"/>
+            </a:fontRef>
+          </p:style>
+          <p:txBody>
+            <a:bodyPr wrap="none" lIns="0" tIns="0" rIns="0" bIns="0" anchor="ctr">
+              <a:spAutoFit/>
+            </a:bodyPr>
+            <a:lstStyle/>
+            <a:p>
+              <a:pPr lvl="0">
+                <a:defRPr sz="1800"/>
+              </a:pPr>
+              <a:r>
+                <a:rPr sz="3600" dirty="0">
+                  <a:solidFill>
+                    <a:srgbClr val="70BF41"/>
+                  </a:solidFill>
+                  <a:latin typeface="Whitney Medium"/>
+                  <a:ea typeface="Whitney Medium"/>
+                  <a:cs typeface="Whitney Medium"/>
+                  <a:sym typeface="Whitney Medium"/>
+                </a:rPr>
+                <a:t>$</a:t>
+              </a:r>
+              <a:r>
+                <a:rPr sz="3600" dirty="0" smtClean="0">
+                  <a:solidFill>
+                    <a:srgbClr val="70BF41"/>
+                  </a:solidFill>
+                  <a:latin typeface="Whitney Medium"/>
+                  <a:ea typeface="Whitney Medium"/>
+                  <a:cs typeface="Whitney Medium"/>
+                  <a:sym typeface="Whitney Medium"/>
+                </a:rPr>
+                <a:t>R</a:t>
+              </a:r>
+              <a:r>
+                <a:rPr lang="en-US" sz="3600" baseline="-5999" dirty="0" smtClean="0">
+                  <a:solidFill>
+                    <a:srgbClr val="70BF41"/>
+                  </a:solidFill>
+                  <a:latin typeface="Whitney Medium"/>
+                  <a:ea typeface="Whitney Medium"/>
+                  <a:cs typeface="Whitney Medium"/>
+                  <a:sym typeface="Whitney Medium"/>
+                </a:rPr>
+                <a:t>5</a:t>
+              </a:r>
+              <a:endParaRPr sz="3600" baseline="-5999" dirty="0">
+                <a:solidFill>
+                  <a:srgbClr val="70BF41"/>
+                </a:solidFill>
+                <a:latin typeface="Whitney Medium"/>
+                <a:ea typeface="Whitney Medium"/>
+                <a:cs typeface="Whitney Medium"/>
+                <a:sym typeface="Whitney Medium"/>
+              </a:endParaRPr>
+            </a:p>
+          </p:txBody>
+        </p:sp>
+        <p:sp>
+          <p:nvSpPr>
+            <p:cNvPr id="57" name="Shape 57"/>
+            <p:cNvSpPr/>
+            <p:nvPr/>
+          </p:nvSpPr>
+          <p:spPr>
+            <a:xfrm>
+              <a:off x="1459342" y="217046"/>
+              <a:ext cx="1689813" cy="647701"/>
+            </a:xfrm>
+            <a:prstGeom prst="rect">
+              <a:avLst/>
+            </a:prstGeom>
+            <a:ln w="12700">
+              <a:miter lim="400000"/>
+            </a:ln>
+            <a:extLst>
+              <a:ext uri="{C572A759-6A51-4108-AA02-DFA0A04FC94B}">
+                <ma14:wrappingTextBoxFlag xmlns:ma14="http://schemas.microsoft.com/office/mac/drawingml/2011/main" xmlns="" val="1"/>
+              </a:ext>
+            </a:extLst>
+          </p:spPr>
+          <p:txBody>
+            <a:bodyPr wrap="none" lIns="50800" tIns="50800" rIns="50800" bIns="50800" anchor="ctr">
+              <a:spAutoFit/>
+            </a:bodyPr>
+            <a:lstStyle>
+              <a:lvl1pPr>
+                <a:defRPr i="1"/>
+              </a:lvl1pPr>
+            </a:lstStyle>
+            <a:p>
+              <a:pPr lvl="0">
+                <a:defRPr sz="1800" i="0"/>
+              </a:pPr>
+              <a:r>
+                <a:rPr sz="3600" i="1" dirty="0"/>
+                <a:t>Stage 1</a:t>
+              </a:r>
+            </a:p>
+          </p:txBody>
+        </p:sp>
+        <p:sp>
+          <p:nvSpPr>
+            <p:cNvPr id="58" name="Shape 58"/>
+            <p:cNvSpPr/>
+            <p:nvPr/>
+          </p:nvSpPr>
+          <p:spPr>
+            <a:xfrm>
+              <a:off x="1459342" y="3068067"/>
+              <a:ext cx="1689813" cy="647701"/>
+            </a:xfrm>
+            <a:prstGeom prst="rect">
+              <a:avLst/>
+            </a:prstGeom>
+            <a:ln w="12700">
+              <a:miter lim="400000"/>
+            </a:ln>
+            <a:extLst>
+              <a:ext uri="{C572A759-6A51-4108-AA02-DFA0A04FC94B}">
+                <ma14:wrappingTextBoxFlag xmlns:ma14="http://schemas.microsoft.com/office/mac/drawingml/2011/main" xmlns="" val="1"/>
+              </a:ext>
+            </a:extLst>
+          </p:spPr>
+          <p:txBody>
+            <a:bodyPr wrap="none" lIns="50800" tIns="50800" rIns="50800" bIns="50800" anchor="ctr">
+              <a:spAutoFit/>
+            </a:bodyPr>
+            <a:lstStyle>
+              <a:lvl1pPr>
+                <a:defRPr i="1"/>
+              </a:lvl1pPr>
+            </a:lstStyle>
+            <a:p>
+              <a:pPr lvl="0">
+                <a:defRPr sz="1800" i="0"/>
+              </a:pPr>
+              <a:r>
+                <a:rPr sz="3600" i="1" dirty="0"/>
+                <a:t>Stage 2</a:t>
+              </a:r>
+            </a:p>
+          </p:txBody>
+        </p:sp>
+        <p:sp>
+          <p:nvSpPr>
+            <p:cNvPr id="59" name="Shape 59"/>
+            <p:cNvSpPr/>
+            <p:nvPr/>
+          </p:nvSpPr>
+          <p:spPr>
+            <a:xfrm>
+              <a:off x="1549400" y="5553841"/>
+              <a:ext cx="1681125" cy="647701"/>
+            </a:xfrm>
+            <a:prstGeom prst="rect">
+              <a:avLst/>
+            </a:prstGeom>
+            <a:ln w="12700">
+              <a:miter lim="400000"/>
+            </a:ln>
+            <a:extLst>
+              <a:ext uri="{C572A759-6A51-4108-AA02-DFA0A04FC94B}">
+                <ma14:wrappingTextBoxFlag xmlns:ma14="http://schemas.microsoft.com/office/mac/drawingml/2011/main" xmlns="" val="1"/>
+              </a:ext>
+            </a:extLst>
+          </p:spPr>
+          <p:txBody>
+            <a:bodyPr wrap="none" lIns="50800" tIns="50800" rIns="50800" bIns="50800" anchor="ctr">
+              <a:spAutoFit/>
+            </a:bodyPr>
+            <a:lstStyle>
+              <a:lvl1pPr>
+                <a:defRPr i="1"/>
+              </a:lvl1pPr>
+            </a:lstStyle>
+            <a:p>
+              <a:pPr lvl="0">
+                <a:defRPr sz="1800" i="0"/>
+              </a:pPr>
+              <a:r>
+                <a:rPr sz="3600" i="1" dirty="0"/>
+                <a:t>Reward</a:t>
+              </a:r>
+            </a:p>
+          </p:txBody>
+        </p:sp>
+        <p:sp>
+          <p:nvSpPr>
+            <p:cNvPr id="60" name="Shape 60"/>
+            <p:cNvSpPr/>
+            <p:nvPr/>
+          </p:nvSpPr>
+          <p:spPr>
+            <a:xfrm>
+              <a:off x="9474200" y="152400"/>
+              <a:ext cx="2256881" cy="4138921"/>
+            </a:xfrm>
+            <a:prstGeom prst="rect">
+              <a:avLst/>
+            </a:prstGeom>
+            <a:ln w="38100">
+              <a:solidFill/>
+              <a:miter lim="400000"/>
+            </a:ln>
+          </p:spPr>
+          <p:txBody>
+            <a:bodyPr lIns="0" tIns="0" rIns="0" bIns="0" anchor="ctr"/>
+            <a:lstStyle/>
+            <a:p>
+              <a:pPr lvl="0">
+                <a:defRPr sz="2400"/>
+              </a:pPr>
+              <a:endParaRPr/>
+            </a:p>
+          </p:txBody>
+        </p:sp>
+        <p:sp>
+          <p:nvSpPr>
+            <p:cNvPr id="61" name="Shape 61"/>
+            <p:cNvSpPr/>
+            <p:nvPr/>
+          </p:nvSpPr>
+          <p:spPr>
+            <a:xfrm>
+              <a:off x="9710033" y="295533"/>
+              <a:ext cx="1785215" cy="838201"/>
+            </a:xfrm>
+            <a:prstGeom prst="rect">
+              <a:avLst/>
+            </a:prstGeom>
+            <a:ln w="12700">
+              <a:miter lim="400000"/>
+            </a:ln>
+            <a:extLst>
+              <a:ext uri="{C572A759-6A51-4108-AA02-DFA0A04FC94B}">
+                <ma14:wrappingTextBoxFlag xmlns:ma14="http://schemas.microsoft.com/office/mac/drawingml/2011/main" xmlns="" val="1"/>
+              </a:ext>
+            </a:extLst>
+          </p:spPr>
+          <p:txBody>
+            <a:bodyPr wrap="none" lIns="50800" tIns="50800" rIns="50800" bIns="50800" anchor="ctr">
+              <a:spAutoFit/>
+            </a:bodyPr>
+            <a:lstStyle/>
+            <a:p>
+              <a:pPr lvl="0">
+                <a:defRPr sz="1800"/>
+              </a:pPr>
+              <a:r>
+                <a:rPr sz="2400"/>
+                <a:t>Transition</a:t>
+              </a:r>
+            </a:p>
+            <a:p>
+              <a:pPr lvl="0">
+                <a:defRPr sz="1800"/>
+              </a:pPr>
+              <a:r>
+                <a:rPr sz="2400"/>
+                <a:t>Probabilities</a:t>
+              </a:r>
+            </a:p>
+          </p:txBody>
+        </p:sp>
+        <p:sp>
+          <p:nvSpPr>
+            <p:cNvPr id="62" name="Shape 62"/>
+            <p:cNvSpPr/>
+            <p:nvPr/>
+          </p:nvSpPr>
+          <p:spPr>
+            <a:xfrm>
+              <a:off x="10038356" y="1533284"/>
+              <a:ext cx="1" cy="647701"/>
+            </a:xfrm>
+            <a:prstGeom prst="line">
+              <a:avLst/>
+            </a:prstGeom>
+            <a:ln w="12700">
+              <a:solidFill/>
+              <a:miter lim="400000"/>
+              <a:tailEnd type="triangle"/>
+            </a:ln>
+          </p:spPr>
+          <p:txBody>
+            <a:bodyPr lIns="0" tIns="0" rIns="0" bIns="0"/>
+            <a:lstStyle/>
+            <a:p>
+              <a:pPr lvl="0">
+                <a:defRPr sz="3000">
+                  <a:solidFill>
+                    <a:srgbClr val="FFFFFF"/>
+                  </a:solidFill>
+                  <a:effectLst>
+                    <a:outerShdw blurRad="38100" dist="12700" dir="5400000" rotWithShape="0">
+                      <a:srgbClr val="000000">
+                        <a:alpha val="50000"/>
+                      </a:srgbClr>
+                    </a:outerShdw>
+                  </a:effectLst>
+                  <a:latin typeface="Gill Sans"/>
+                  <a:ea typeface="Gill Sans"/>
+                  <a:cs typeface="Gill Sans"/>
+                  <a:sym typeface="Gill Sans"/>
+                </a:defRPr>
+              </a:pPr>
+              <a:endParaRPr/>
+            </a:p>
+          </p:txBody>
+        </p:sp>
+        <p:sp>
+          <p:nvSpPr>
+            <p:cNvPr id="63" name="Shape 63"/>
+            <p:cNvSpPr/>
+            <p:nvPr/>
+          </p:nvSpPr>
+          <p:spPr>
+            <a:xfrm>
+              <a:off x="10038356" y="2460909"/>
+              <a:ext cx="1" cy="652203"/>
+            </a:xfrm>
+            <a:prstGeom prst="line">
+              <a:avLst/>
+            </a:prstGeom>
+            <a:ln w="50800">
+              <a:solidFill/>
+              <a:miter lim="400000"/>
+              <a:tailEnd type="triangle"/>
+            </a:ln>
+          </p:spPr>
+          <p:txBody>
+            <a:bodyPr lIns="0" tIns="0" rIns="0" bIns="0"/>
+            <a:lstStyle/>
+            <a:p>
+              <a:pPr lvl="0">
+                <a:defRPr sz="3000">
+                  <a:solidFill>
+                    <a:srgbClr val="FFFFFF"/>
+                  </a:solidFill>
+                  <a:effectLst>
+                    <a:outerShdw blurRad="38100" dist="12700" dir="5400000" rotWithShape="0">
+                      <a:srgbClr val="000000">
+                        <a:alpha val="50000"/>
+                      </a:srgbClr>
+                    </a:outerShdw>
+                  </a:effectLst>
+                  <a:latin typeface="Gill Sans"/>
+                  <a:ea typeface="Gill Sans"/>
+                  <a:cs typeface="Gill Sans"/>
+                  <a:sym typeface="Gill Sans"/>
+                </a:defRPr>
+              </a:pPr>
+              <a:endParaRPr/>
+            </a:p>
+          </p:txBody>
+        </p:sp>
+        <p:sp>
+          <p:nvSpPr>
+            <p:cNvPr id="64" name="Shape 64"/>
+            <p:cNvSpPr/>
+            <p:nvPr/>
+          </p:nvSpPr>
+          <p:spPr>
+            <a:xfrm>
+              <a:off x="10367054" y="2532545"/>
+              <a:ext cx="925374" cy="469901"/>
+            </a:xfrm>
+            <a:prstGeom prst="rect">
+              <a:avLst/>
+            </a:prstGeom>
+            <a:ln w="12700">
+              <a:miter lim="400000"/>
+            </a:ln>
+            <a:extLst>
+              <a:ext uri="{C572A759-6A51-4108-AA02-DFA0A04FC94B}">
+                <ma14:wrappingTextBoxFlag xmlns:ma14="http://schemas.microsoft.com/office/mac/drawingml/2011/main" xmlns="" val="1"/>
+              </a:ext>
+            </a:extLst>
+          </p:spPr>
+          <p:txBody>
+            <a:bodyPr wrap="none" lIns="50800" tIns="50800" rIns="50800" bIns="50800" anchor="ctr">
+              <a:spAutoFit/>
+            </a:bodyPr>
+            <a:lstStyle>
+              <a:lvl1pPr>
+                <a:defRPr sz="2400"/>
+              </a:lvl1pPr>
+            </a:lstStyle>
+            <a:p>
+              <a:pPr lvl="0">
+                <a:defRPr sz="1800"/>
+              </a:pPr>
+              <a:r>
+                <a:rPr sz="2400"/>
+                <a:t>p = .8</a:t>
+              </a:r>
+            </a:p>
+          </p:txBody>
+        </p:sp>
+        <p:sp>
+          <p:nvSpPr>
+            <p:cNvPr id="65" name="Shape 65"/>
+            <p:cNvSpPr/>
+            <p:nvPr/>
+          </p:nvSpPr>
+          <p:spPr>
+            <a:xfrm>
+              <a:off x="10389716" y="1574953"/>
+              <a:ext cx="880049" cy="471924"/>
+            </a:xfrm>
+            <a:prstGeom prst="rect">
+              <a:avLst/>
+            </a:prstGeom>
+            <a:ln w="12700">
+              <a:miter lim="400000"/>
+            </a:ln>
+            <a:extLst>
+              <a:ext uri="{C572A759-6A51-4108-AA02-DFA0A04FC94B}">
+                <ma14:wrappingTextBoxFlag xmlns:ma14="http://schemas.microsoft.com/office/mac/drawingml/2011/main" xmlns="" val="1"/>
+              </a:ext>
+            </a:extLst>
+          </p:spPr>
+          <p:txBody>
+            <a:bodyPr wrap="none" lIns="50800" tIns="50800" rIns="50800" bIns="50800" anchor="ctr">
+              <a:spAutoFit/>
+            </a:bodyPr>
+            <a:lstStyle>
+              <a:lvl1pPr>
+                <a:defRPr sz="2400"/>
+              </a:lvl1pPr>
+            </a:lstStyle>
+            <a:p>
+              <a:pPr lvl="0">
+                <a:defRPr sz="1800"/>
+              </a:pPr>
+              <a:r>
+                <a:rPr sz="2400" dirty="0"/>
+                <a:t>p = </a:t>
+              </a:r>
+              <a:r>
+                <a:rPr sz="2400" dirty="0" smtClean="0"/>
+                <a:t>.</a:t>
+              </a:r>
+              <a:r>
+                <a:rPr lang="en-US" sz="2400" dirty="0" smtClean="0"/>
+                <a:t>2</a:t>
+              </a:r>
+              <a:endParaRPr sz="2400" dirty="0"/>
+            </a:p>
+          </p:txBody>
+        </p:sp>
+        <p:sp>
+          <p:nvSpPr>
+            <p:cNvPr id="66" name="Shape 66"/>
+            <p:cNvSpPr/>
+            <p:nvPr/>
+          </p:nvSpPr>
+          <p:spPr>
+            <a:xfrm>
+              <a:off x="10038356" y="3407870"/>
+              <a:ext cx="1" cy="556261"/>
+            </a:xfrm>
+            <a:prstGeom prst="line">
+              <a:avLst/>
+            </a:prstGeom>
+            <a:ln w="76200">
+              <a:solidFill/>
+              <a:miter lim="400000"/>
+              <a:tailEnd type="triangle"/>
+            </a:ln>
+          </p:spPr>
+          <p:txBody>
+            <a:bodyPr lIns="0" tIns="0" rIns="0" bIns="0"/>
+            <a:lstStyle/>
+            <a:p>
+              <a:pPr lvl="0">
+                <a:defRPr sz="3000">
+                  <a:solidFill>
+                    <a:srgbClr val="FFFFFF"/>
+                  </a:solidFill>
+                  <a:effectLst>
+                    <a:outerShdw blurRad="38100" dist="12700" dir="5400000" rotWithShape="0">
+                      <a:srgbClr val="000000">
+                        <a:alpha val="50000"/>
+                      </a:srgbClr>
+                    </a:outerShdw>
+                  </a:effectLst>
+                  <a:latin typeface="Gill Sans"/>
+                  <a:ea typeface="Gill Sans"/>
+                  <a:cs typeface="Gill Sans"/>
+                  <a:sym typeface="Gill Sans"/>
+                </a:defRPr>
+              </a:pPr>
+              <a:endParaRPr/>
+            </a:p>
+          </p:txBody>
+        </p:sp>
+        <p:sp>
+          <p:nvSpPr>
+            <p:cNvPr id="67" name="Shape 67"/>
+            <p:cNvSpPr/>
+            <p:nvPr/>
+          </p:nvSpPr>
+          <p:spPr>
+            <a:xfrm>
+              <a:off x="10409421" y="3451050"/>
+              <a:ext cx="840639" cy="469901"/>
+            </a:xfrm>
+            <a:prstGeom prst="rect">
+              <a:avLst/>
+            </a:prstGeom>
+            <a:ln w="12700">
+              <a:miter lim="400000"/>
+            </a:ln>
+            <a:extLst>
+              <a:ext uri="{C572A759-6A51-4108-AA02-DFA0A04FC94B}">
+                <ma14:wrappingTextBoxFlag xmlns:ma14="http://schemas.microsoft.com/office/mac/drawingml/2011/main" xmlns="" val="1"/>
+              </a:ext>
+            </a:extLst>
+          </p:spPr>
+          <p:txBody>
+            <a:bodyPr wrap="none" lIns="50800" tIns="50800" rIns="50800" bIns="50800" anchor="ctr">
+              <a:spAutoFit/>
+            </a:bodyPr>
+            <a:lstStyle>
+              <a:lvl1pPr>
+                <a:defRPr sz="2400"/>
+              </a:lvl1pPr>
+            </a:lstStyle>
+            <a:p>
+              <a:pPr lvl="0">
+                <a:defRPr sz="1800"/>
+              </a:pPr>
+              <a:r>
+                <a:rPr sz="2400"/>
+                <a:t>p = 1</a:t>
+              </a:r>
+            </a:p>
+          </p:txBody>
+        </p:sp>
+        <p:sp>
+          <p:nvSpPr>
+            <p:cNvPr id="2" name="Rectangle 1"/>
+            <p:cNvSpPr/>
+            <p:nvPr/>
+          </p:nvSpPr>
+          <p:spPr>
+            <a:xfrm>
+              <a:off x="4554542" y="217046"/>
+              <a:ext cx="2453252" cy="637462"/>
+            </a:xfrm>
+            <a:prstGeom prst="rect">
+              <a:avLst/>
+            </a:prstGeom>
+            <a:noFill/>
+            <a:ln/>
+          </p:spPr>
+          <p:style>
+            <a:lnRef idx="2">
+              <a:schemeClr val="dk1"/>
+            </a:lnRef>
+            <a:fillRef idx="1">
+              <a:schemeClr val="lt1"/>
+            </a:fillRef>
+            <a:effectRef idx="0">
+              <a:schemeClr val="dk1"/>
+            </a:effectRef>
+            <a:fontRef idx="minor">
+              <a:schemeClr val="dk1"/>
+            </a:fontRef>
+          </p:style>
+          <p:txBody>
+            <a:bodyPr rot="0" spcFirstLastPara="1" vertOverflow="overflow" horzOverflow="overflow" vert="horz" wrap="square" lIns="50800" tIns="50800" rIns="50800" bIns="50800" numCol="1" spcCol="38100" rtlCol="0" anchor="ctr">
+              <a:spAutoFit/>
+            </a:bodyPr>
+            <a:lstStyle/>
+            <a:p>
+              <a:pPr marL="0" marR="0" indent="0" algn="ctr" defTabSz="584200" rtl="0" fontAlgn="auto" latinLnBrk="1" hangingPunct="0">
+                <a:lnSpc>
+                  <a:spcPct val="100000"/>
+                </a:lnSpc>
+                <a:spcBef>
+                  <a:spcPts val="0"/>
+                </a:spcBef>
+                <a:spcAft>
+                  <a:spcPts val="0"/>
+                </a:spcAft>
+                <a:buClrTx/>
+                <a:buSzTx/>
+                <a:buFontTx/>
+                <a:buNone/>
+                <a:tabLst/>
+              </a:pPr>
+              <a:endParaRPr kumimoji="0" lang="en-US" sz="2400" b="0" i="0" u="none" strike="noStrike" cap="none" spc="0" normalizeH="0" baseline="0">
+                <a:ln>
+                  <a:noFill/>
+                </a:ln>
+                <a:solidFill>
+                  <a:srgbClr val="FFFFFF"/>
+                </a:solidFill>
+                <a:effectLst/>
+                <a:uFillTx/>
+                <a:latin typeface="+mn-lt"/>
+                <a:ea typeface="+mn-ea"/>
+                <a:cs typeface="+mn-cs"/>
+                <a:sym typeface="Helvetica Light"/>
+              </a:endParaRPr>
+            </a:p>
+          </p:txBody>
+        </p:sp>
+        <p:sp>
+          <p:nvSpPr>
+            <p:cNvPr id="33" name="Shape 33"/>
+            <p:cNvSpPr/>
+            <p:nvPr/>
+          </p:nvSpPr>
+          <p:spPr>
+            <a:xfrm flipH="1">
+              <a:off x="4292600" y="3777612"/>
+              <a:ext cx="592654" cy="1504310"/>
+            </a:xfrm>
+            <a:prstGeom prst="line">
+              <a:avLst/>
+            </a:prstGeom>
+            <a:ln w="76200">
+              <a:solidFill/>
+              <a:miter lim="400000"/>
+              <a:tailEnd type="triangle"/>
+            </a:ln>
+          </p:spPr>
+          <p:txBody>
+            <a:bodyPr lIns="0" tIns="0" rIns="0" bIns="0"/>
+            <a:lstStyle/>
+            <a:p>
+              <a:pPr lvl="0">
+                <a:defRPr sz="3000">
+                  <a:solidFill>
+                    <a:srgbClr val="FFFFFF"/>
+                  </a:solidFill>
+                  <a:effectLst>
+                    <a:outerShdw blurRad="38100" dist="12700" dir="5400000" rotWithShape="0">
+                      <a:srgbClr val="000000">
+                        <a:alpha val="50000"/>
+                      </a:srgbClr>
+                    </a:outerShdw>
+                  </a:effectLst>
+                  <a:latin typeface="Gill Sans"/>
+                  <a:ea typeface="Gill Sans"/>
+                  <a:cs typeface="Gill Sans"/>
+                  <a:sym typeface="Gill Sans"/>
+                </a:defRPr>
+              </a:pPr>
+              <a:endParaRPr/>
+            </a:p>
+          </p:txBody>
+        </p:sp>
+        <p:sp>
+          <p:nvSpPr>
+            <p:cNvPr id="51" name="Shape 33"/>
+            <p:cNvSpPr/>
+            <p:nvPr/>
+          </p:nvSpPr>
+          <p:spPr>
+            <a:xfrm>
+              <a:off x="4939283" y="3777610"/>
+              <a:ext cx="343917" cy="1504311"/>
+            </a:xfrm>
+            <a:prstGeom prst="line">
+              <a:avLst/>
+            </a:prstGeom>
+            <a:ln w="76200">
+              <a:solidFill/>
+              <a:miter lim="400000"/>
+              <a:tailEnd type="triangle"/>
+            </a:ln>
+          </p:spPr>
+          <p:txBody>
+            <a:bodyPr lIns="0" tIns="0" rIns="0" bIns="0"/>
+            <a:lstStyle/>
+            <a:p>
+              <a:pPr lvl="0">
+                <a:defRPr sz="3000">
+                  <a:solidFill>
+                    <a:srgbClr val="FFFFFF"/>
+                  </a:solidFill>
+                  <a:effectLst>
+                    <a:outerShdw blurRad="38100" dist="12700" dir="5400000" rotWithShape="0">
+                      <a:srgbClr val="000000">
+                        <a:alpha val="50000"/>
+                      </a:srgbClr>
+                    </a:outerShdw>
+                  </a:effectLst>
+                  <a:latin typeface="Gill Sans"/>
+                  <a:ea typeface="Gill Sans"/>
+                  <a:cs typeface="Gill Sans"/>
+                  <a:sym typeface="Gill Sans"/>
+                </a:defRPr>
+              </a:pPr>
+              <a:endParaRPr/>
+            </a:p>
+          </p:txBody>
+        </p:sp>
+        <p:sp>
+          <p:nvSpPr>
+            <p:cNvPr id="78" name="Shape 36"/>
+            <p:cNvSpPr/>
+            <p:nvPr/>
+          </p:nvSpPr>
+          <p:spPr>
+            <a:xfrm>
+              <a:off x="6390847" y="3047999"/>
+              <a:ext cx="687835" cy="687835"/>
+            </a:xfrm>
+            <a:prstGeom prst="rect">
+              <a:avLst/>
+            </a:prstGeom>
+            <a:solidFill>
+              <a:srgbClr val="EC5D57"/>
+            </a:solidFill>
+            <a:ln w="12700">
+              <a:miter lim="400000"/>
+            </a:ln>
+          </p:spPr>
+          <p:txBody>
+            <a:bodyPr lIns="0" tIns="0" rIns="0" bIns="0" anchor="ctr"/>
+            <a:lstStyle/>
+            <a:p>
+              <a:pPr lvl="0">
+                <a:defRPr sz="3000">
+                  <a:solidFill>
+                    <a:srgbClr val="FFFFFF"/>
+                  </a:solidFill>
+                  <a:effectLst>
+                    <a:outerShdw blurRad="38100" dist="12700" dir="5400000" rotWithShape="0">
+                      <a:srgbClr val="000000">
+                        <a:alpha val="50000"/>
+                      </a:srgbClr>
+                    </a:outerShdw>
+                  </a:effectLst>
+                  <a:latin typeface="Whitney Medium"/>
+                  <a:ea typeface="Whitney Medium"/>
+                  <a:cs typeface="Whitney Medium"/>
+                  <a:sym typeface="Whitney Medium"/>
+                </a:defRPr>
+              </a:pPr>
+              <a:r>
+                <a:rPr lang="en-US" dirty="0" smtClean="0"/>
+                <a:t>r</a:t>
+              </a:r>
+              <a:endParaRPr dirty="0"/>
+            </a:p>
+          </p:txBody>
+        </p:sp>
+        <p:sp>
+          <p:nvSpPr>
+            <p:cNvPr id="79" name="Shape 38"/>
+            <p:cNvSpPr/>
+            <p:nvPr/>
+          </p:nvSpPr>
+          <p:spPr>
+            <a:xfrm>
+              <a:off x="7991048" y="3027933"/>
+              <a:ext cx="687835" cy="687835"/>
+            </a:xfrm>
+            <a:prstGeom prst="rect">
+              <a:avLst/>
+            </a:prstGeom>
+            <a:solidFill>
+              <a:srgbClr val="70BF41"/>
+            </a:solidFill>
+            <a:ln w="12700">
+              <a:miter lim="400000"/>
+            </a:ln>
+          </p:spPr>
+          <p:txBody>
+            <a:bodyPr lIns="0" tIns="0" rIns="0" bIns="0" anchor="ctr"/>
+            <a:lstStyle/>
+            <a:p>
+              <a:pPr lvl="0">
+                <a:defRPr sz="3000">
+                  <a:solidFill>
+                    <a:srgbClr val="FFFFFF"/>
+                  </a:solidFill>
+                  <a:effectLst>
+                    <a:outerShdw blurRad="38100" dist="12700" dir="5400000" rotWithShape="0">
+                      <a:srgbClr val="000000">
+                        <a:alpha val="50000"/>
+                      </a:srgbClr>
+                    </a:outerShdw>
+                  </a:effectLst>
+                  <a:latin typeface="Whitney Medium"/>
+                  <a:ea typeface="Whitney Medium"/>
+                  <a:cs typeface="Whitney Medium"/>
+                  <a:sym typeface="Whitney Medium"/>
+                </a:defRPr>
+              </a:pPr>
+              <a:r>
+                <a:rPr lang="en-US" dirty="0" smtClean="0"/>
+                <a:t>g</a:t>
+              </a:r>
+              <a:endParaRPr dirty="0"/>
+            </a:p>
+          </p:txBody>
+        </p:sp>
+        <p:grpSp>
+          <p:nvGrpSpPr>
+            <p:cNvPr id="81" name="Group 80"/>
+            <p:cNvGrpSpPr/>
+            <p:nvPr/>
+          </p:nvGrpSpPr>
+          <p:grpSpPr>
+            <a:xfrm>
+              <a:off x="6240484" y="3777610"/>
+              <a:ext cx="947716" cy="1504312"/>
+              <a:chOff x="4445001" y="3777610"/>
+              <a:chExt cx="947716" cy="1504312"/>
+            </a:xfrm>
+          </p:grpSpPr>
+          <p:sp>
+            <p:nvSpPr>
+              <p:cNvPr id="82" name="Shape 33"/>
+              <p:cNvSpPr/>
+              <p:nvPr/>
+            </p:nvSpPr>
+            <p:spPr>
+              <a:xfrm flipH="1">
+                <a:off x="4445001" y="3777611"/>
+                <a:ext cx="440253" cy="1504311"/>
+              </a:xfrm>
+              <a:prstGeom prst="line">
+                <a:avLst/>
+              </a:prstGeom>
+              <a:ln w="76200">
+                <a:solidFill/>
+                <a:miter lim="400000"/>
+                <a:tailEnd type="triangle"/>
+              </a:ln>
+            </p:spPr>
+            <p:txBody>
+              <a:bodyPr lIns="0" tIns="0" rIns="0" bIns="0"/>
+              <a:lstStyle/>
+              <a:p>
+                <a:pPr lvl="0">
+                  <a:defRPr sz="3000">
+                    <a:solidFill>
+                      <a:srgbClr val="FFFFFF"/>
+                    </a:solidFill>
+                    <a:effectLst>
+                      <a:outerShdw blurRad="38100" dist="12700" dir="5400000" rotWithShape="0">
+                        <a:srgbClr val="000000">
+                          <a:alpha val="50000"/>
+                        </a:srgbClr>
+                      </a:outerShdw>
+                    </a:effectLst>
+                    <a:latin typeface="Gill Sans"/>
+                    <a:ea typeface="Gill Sans"/>
+                    <a:cs typeface="Gill Sans"/>
+                    <a:sym typeface="Gill Sans"/>
+                  </a:defRPr>
+                </a:pPr>
+                <a:endParaRPr/>
+              </a:p>
+            </p:txBody>
+          </p:sp>
+          <p:sp>
+            <p:nvSpPr>
+              <p:cNvPr id="83" name="Shape 33"/>
+              <p:cNvSpPr/>
+              <p:nvPr/>
+            </p:nvSpPr>
+            <p:spPr>
+              <a:xfrm>
+                <a:off x="4939283" y="3777610"/>
+                <a:ext cx="453434" cy="1504311"/>
+              </a:xfrm>
+              <a:prstGeom prst="line">
+                <a:avLst/>
+              </a:prstGeom>
+              <a:ln w="76200">
+                <a:solidFill/>
+                <a:miter lim="400000"/>
+                <a:tailEnd type="triangle"/>
+              </a:ln>
+            </p:spPr>
+            <p:txBody>
+              <a:bodyPr lIns="0" tIns="0" rIns="0" bIns="0"/>
+              <a:lstStyle/>
+              <a:p>
+                <a:pPr lvl="0">
+                  <a:defRPr sz="3000">
+                    <a:solidFill>
+                      <a:srgbClr val="FFFFFF"/>
+                    </a:solidFill>
+                    <a:effectLst>
+                      <a:outerShdw blurRad="38100" dist="12700" dir="5400000" rotWithShape="0">
+                        <a:srgbClr val="000000">
+                          <a:alpha val="50000"/>
+                        </a:srgbClr>
+                      </a:outerShdw>
+                    </a:effectLst>
+                    <a:latin typeface="Gill Sans"/>
+                    <a:ea typeface="Gill Sans"/>
+                    <a:cs typeface="Gill Sans"/>
+                    <a:sym typeface="Gill Sans"/>
+                  </a:defRPr>
+                </a:pPr>
+                <a:endParaRPr/>
+              </a:p>
+            </p:txBody>
+          </p:sp>
+        </p:grpSp>
+        <p:sp>
+          <p:nvSpPr>
+            <p:cNvPr id="86" name="Shape 33"/>
+            <p:cNvSpPr/>
+            <p:nvPr/>
+          </p:nvSpPr>
+          <p:spPr>
+            <a:xfrm flipH="1">
+              <a:off x="7991047" y="3777611"/>
+              <a:ext cx="289889" cy="1504311"/>
+            </a:xfrm>
+            <a:prstGeom prst="line">
+              <a:avLst/>
+            </a:prstGeom>
+            <a:ln w="76200">
+              <a:solidFill/>
+              <a:miter lim="400000"/>
+              <a:tailEnd type="triangle"/>
+            </a:ln>
+          </p:spPr>
+          <p:txBody>
+            <a:bodyPr lIns="0" tIns="0" rIns="0" bIns="0"/>
+            <a:lstStyle/>
+            <a:p>
+              <a:pPr lvl="0">
+                <a:defRPr sz="3000">
+                  <a:solidFill>
+                    <a:srgbClr val="FFFFFF"/>
+                  </a:solidFill>
+                  <a:effectLst>
+                    <a:outerShdw blurRad="38100" dist="12700" dir="5400000" rotWithShape="0">
+                      <a:srgbClr val="000000">
+                        <a:alpha val="50000"/>
+                      </a:srgbClr>
+                    </a:outerShdw>
+                  </a:effectLst>
+                  <a:latin typeface="Gill Sans"/>
+                  <a:ea typeface="Gill Sans"/>
+                  <a:cs typeface="Gill Sans"/>
+                  <a:sym typeface="Gill Sans"/>
+                </a:defRPr>
+              </a:pPr>
+              <a:endParaRPr/>
+            </a:p>
+          </p:txBody>
+        </p:sp>
+        <p:sp>
+          <p:nvSpPr>
+            <p:cNvPr id="87" name="Shape 33"/>
+            <p:cNvSpPr/>
+            <p:nvPr/>
+          </p:nvSpPr>
+          <p:spPr>
+            <a:xfrm>
+              <a:off x="8334966" y="3777610"/>
+              <a:ext cx="676775" cy="1504312"/>
+            </a:xfrm>
+            <a:prstGeom prst="line">
+              <a:avLst/>
+            </a:prstGeom>
+            <a:ln w="76200">
+              <a:solidFill/>
+              <a:miter lim="400000"/>
+              <a:tailEnd type="triangle"/>
+            </a:ln>
+          </p:spPr>
+          <p:txBody>
+            <a:bodyPr lIns="0" tIns="0" rIns="0" bIns="0"/>
+            <a:lstStyle/>
+            <a:p>
+              <a:pPr lvl="0">
+                <a:defRPr sz="3000">
+                  <a:solidFill>
+                    <a:srgbClr val="FFFFFF"/>
+                  </a:solidFill>
+                  <a:effectLst>
+                    <a:outerShdw blurRad="38100" dist="12700" dir="5400000" rotWithShape="0">
+                      <a:srgbClr val="000000">
+                        <a:alpha val="50000"/>
+                      </a:srgbClr>
+                    </a:outerShdw>
+                  </a:effectLst>
+                  <a:latin typeface="Gill Sans"/>
+                  <a:ea typeface="Gill Sans"/>
+                  <a:cs typeface="Gill Sans"/>
+                  <a:sym typeface="Gill Sans"/>
+                </a:defRPr>
+              </a:pPr>
+              <a:endParaRPr/>
+            </a:p>
+          </p:txBody>
+        </p:sp>
+        <p:sp>
+          <p:nvSpPr>
+            <p:cNvPr id="88" name="Shape 35"/>
+            <p:cNvSpPr/>
+            <p:nvPr/>
+          </p:nvSpPr>
+          <p:spPr>
+            <a:xfrm>
+              <a:off x="6807773" y="5601829"/>
+              <a:ext cx="761427" cy="553998"/>
+            </a:xfrm>
+            <a:prstGeom prst="rect">
+              <a:avLst/>
+            </a:prstGeom>
+            <a:ln/>
+            <a:extLst>
+              <a:ext uri="{C572A759-6A51-4108-AA02-DFA0A04FC94B}">
+                <ma14:wrappingTextBoxFlag xmlns:ma14="http://schemas.microsoft.com/office/mac/drawingml/2011/main" xmlns="" val="1"/>
+              </a:ext>
+            </a:extLst>
+          </p:spPr>
+          <p:style>
+            <a:lnRef idx="2">
+              <a:schemeClr val="accent5"/>
+            </a:lnRef>
+            <a:fillRef idx="1">
+              <a:schemeClr val="lt1"/>
+            </a:fillRef>
+            <a:effectRef idx="0">
+              <a:schemeClr val="accent5"/>
+            </a:effectRef>
+            <a:fontRef idx="minor">
+              <a:schemeClr val="dk1"/>
+            </a:fontRef>
+          </p:style>
+          <p:txBody>
+            <a:bodyPr wrap="none" lIns="0" tIns="0" rIns="0" bIns="0" anchor="ctr">
+              <a:spAutoFit/>
+            </a:bodyPr>
+            <a:lstStyle/>
+            <a:p>
+              <a:pPr lvl="0">
+                <a:defRPr sz="1800"/>
+              </a:pPr>
+              <a:r>
+                <a:rPr sz="3600" dirty="0">
+                  <a:solidFill>
+                    <a:srgbClr val="EC5D57"/>
+                  </a:solidFill>
+                  <a:latin typeface="Whitney Medium"/>
+                  <a:ea typeface="Whitney Medium"/>
+                  <a:cs typeface="Whitney Medium"/>
+                  <a:sym typeface="Whitney Medium"/>
+                </a:rPr>
+                <a:t>$</a:t>
+              </a:r>
+              <a:r>
+                <a:rPr sz="3600" dirty="0" smtClean="0">
+                  <a:solidFill>
+                    <a:srgbClr val="EC5D57"/>
+                  </a:solidFill>
+                  <a:latin typeface="Whitney Medium"/>
+                  <a:ea typeface="Whitney Medium"/>
+                  <a:cs typeface="Whitney Medium"/>
+                  <a:sym typeface="Whitney Medium"/>
+                </a:rPr>
+                <a:t>R</a:t>
+              </a:r>
+              <a:r>
+                <a:rPr lang="en-US" sz="3600" baseline="-5999" dirty="0" smtClean="0">
+                  <a:solidFill>
+                    <a:srgbClr val="EC5D57"/>
+                  </a:solidFill>
+                  <a:latin typeface="Whitney Medium"/>
+                  <a:ea typeface="Whitney Medium"/>
+                  <a:cs typeface="Whitney Medium"/>
+                  <a:sym typeface="Whitney Medium"/>
+                </a:rPr>
+                <a:t>4</a:t>
+              </a:r>
+              <a:endParaRPr sz="3600" baseline="-5999" dirty="0">
+                <a:solidFill>
+                  <a:srgbClr val="EC5D57"/>
+                </a:solidFill>
+                <a:latin typeface="Whitney Medium"/>
+                <a:ea typeface="Whitney Medium"/>
+                <a:cs typeface="Whitney Medium"/>
+                <a:sym typeface="Whitney Medium"/>
+              </a:endParaRPr>
+            </a:p>
+          </p:txBody>
+        </p:sp>
+        <p:sp>
+          <p:nvSpPr>
+            <p:cNvPr id="90" name="Shape 32"/>
+            <p:cNvSpPr/>
+            <p:nvPr/>
+          </p:nvSpPr>
+          <p:spPr>
+            <a:xfrm>
+              <a:off x="4902200" y="5599564"/>
+              <a:ext cx="778613" cy="556261"/>
+            </a:xfrm>
+            <a:prstGeom prst="rect">
+              <a:avLst/>
+            </a:prstGeom>
+            <a:ln/>
+            <a:extLst>
+              <a:ext uri="{C572A759-6A51-4108-AA02-DFA0A04FC94B}">
+                <ma14:wrappingTextBoxFlag xmlns:ma14="http://schemas.microsoft.com/office/mac/drawingml/2011/main" xmlns="" val="1"/>
+              </a:ext>
+            </a:extLst>
+          </p:spPr>
+          <p:style>
+            <a:lnRef idx="2">
+              <a:schemeClr val="accent1"/>
+            </a:lnRef>
+            <a:fillRef idx="1">
+              <a:schemeClr val="lt1"/>
+            </a:fillRef>
+            <a:effectRef idx="0">
+              <a:schemeClr val="accent1"/>
+            </a:effectRef>
+            <a:fontRef idx="minor">
+              <a:schemeClr val="dk1"/>
+            </a:fontRef>
+          </p:style>
+          <p:txBody>
+            <a:bodyPr wrap="none" lIns="0" tIns="0" rIns="0" bIns="0" anchor="ctr">
+              <a:spAutoFit/>
+            </a:bodyPr>
+            <a:lstStyle/>
+            <a:p>
+              <a:pPr lvl="0">
+                <a:defRPr sz="1800"/>
+              </a:pPr>
+              <a:r>
+                <a:rPr sz="3600" dirty="0">
+                  <a:solidFill>
+                    <a:srgbClr val="51A7F9"/>
+                  </a:solidFill>
+                  <a:latin typeface="Whitney Medium"/>
+                  <a:ea typeface="Whitney Medium"/>
+                  <a:cs typeface="Whitney Medium"/>
+                  <a:sym typeface="Whitney Medium"/>
+                </a:rPr>
+                <a:t>$</a:t>
+              </a:r>
+              <a:r>
+                <a:rPr sz="3600" dirty="0" smtClean="0">
+                  <a:solidFill>
+                    <a:srgbClr val="51A7F9"/>
+                  </a:solidFill>
+                  <a:latin typeface="Whitney Medium"/>
+                  <a:ea typeface="Whitney Medium"/>
+                  <a:cs typeface="Whitney Medium"/>
+                  <a:sym typeface="Whitney Medium"/>
+                </a:rPr>
+                <a:t>R</a:t>
+              </a:r>
+              <a:r>
+                <a:rPr lang="en-US" sz="3600" baseline="-5999" dirty="0" smtClean="0">
+                  <a:solidFill>
+                    <a:srgbClr val="51A7F9"/>
+                  </a:solidFill>
+                  <a:latin typeface="Whitney Medium"/>
+                  <a:ea typeface="Whitney Medium"/>
+                  <a:cs typeface="Whitney Medium"/>
+                  <a:sym typeface="Whitney Medium"/>
+                </a:rPr>
+                <a:t>2</a:t>
+              </a:r>
+              <a:endParaRPr sz="3600" baseline="-5999" dirty="0">
+                <a:solidFill>
+                  <a:srgbClr val="51A7F9"/>
+                </a:solidFill>
+                <a:latin typeface="Whitney Medium"/>
+                <a:ea typeface="Whitney Medium"/>
+                <a:cs typeface="Whitney Medium"/>
+                <a:sym typeface="Whitney Medium"/>
+              </a:endParaRPr>
+            </a:p>
+          </p:txBody>
+        </p:sp>
+        <p:sp>
+          <p:nvSpPr>
+            <p:cNvPr id="91" name="Shape 55"/>
+            <p:cNvSpPr/>
+            <p:nvPr/>
+          </p:nvSpPr>
+          <p:spPr>
+            <a:xfrm>
+              <a:off x="8701683" y="5599562"/>
+              <a:ext cx="772517" cy="556261"/>
+            </a:xfrm>
+            <a:prstGeom prst="rect">
+              <a:avLst/>
+            </a:prstGeom>
+            <a:ln/>
+            <a:extLst>
+              <a:ext uri="{C572A759-6A51-4108-AA02-DFA0A04FC94B}">
+                <ma14:wrappingTextBoxFlag xmlns:ma14="http://schemas.microsoft.com/office/mac/drawingml/2011/main" xmlns="" val="1"/>
+              </a:ext>
+            </a:extLst>
+          </p:spPr>
+          <p:style>
+            <a:lnRef idx="2">
+              <a:schemeClr val="accent2"/>
+            </a:lnRef>
+            <a:fillRef idx="1">
+              <a:schemeClr val="lt1"/>
+            </a:fillRef>
+            <a:effectRef idx="0">
+              <a:schemeClr val="accent2"/>
+            </a:effectRef>
+            <a:fontRef idx="minor">
+              <a:schemeClr val="dk1"/>
+            </a:fontRef>
+          </p:style>
+          <p:txBody>
+            <a:bodyPr wrap="none" lIns="0" tIns="0" rIns="0" bIns="0" anchor="ctr">
+              <a:spAutoFit/>
+            </a:bodyPr>
+            <a:lstStyle/>
+            <a:p>
+              <a:pPr lvl="0">
+                <a:defRPr sz="1800"/>
+              </a:pPr>
+              <a:r>
+                <a:rPr sz="3600" dirty="0">
+                  <a:solidFill>
+                    <a:srgbClr val="70BF41"/>
+                  </a:solidFill>
+                  <a:latin typeface="Whitney Medium"/>
+                  <a:ea typeface="Whitney Medium"/>
+                  <a:cs typeface="Whitney Medium"/>
+                  <a:sym typeface="Whitney Medium"/>
+                </a:rPr>
+                <a:t>$</a:t>
+              </a:r>
+              <a:r>
+                <a:rPr sz="3600" dirty="0" smtClean="0">
+                  <a:solidFill>
+                    <a:srgbClr val="70BF41"/>
+                  </a:solidFill>
+                  <a:latin typeface="Whitney Medium"/>
+                  <a:ea typeface="Whitney Medium"/>
+                  <a:cs typeface="Whitney Medium"/>
+                  <a:sym typeface="Whitney Medium"/>
+                </a:rPr>
+                <a:t>R</a:t>
+              </a:r>
+              <a:r>
+                <a:rPr lang="en-US" sz="3600" baseline="-5999" dirty="0" smtClean="0">
+                  <a:solidFill>
+                    <a:srgbClr val="70BF41"/>
+                  </a:solidFill>
+                  <a:latin typeface="Whitney Medium"/>
+                  <a:ea typeface="Whitney Medium"/>
+                  <a:cs typeface="Whitney Medium"/>
+                  <a:sym typeface="Whitney Medium"/>
+                </a:rPr>
+                <a:t>6</a:t>
+              </a:r>
+              <a:endParaRPr sz="3600" baseline="-5999" dirty="0">
+                <a:solidFill>
+                  <a:srgbClr val="70BF41"/>
+                </a:solidFill>
+                <a:latin typeface="Whitney Medium"/>
+                <a:ea typeface="Whitney Medium"/>
+                <a:cs typeface="Whitney Medium"/>
+                <a:sym typeface="Whitney Medium"/>
+              </a:endParaRPr>
+            </a:p>
+          </p:txBody>
+        </p:sp>
+        <p:sp>
+          <p:nvSpPr>
+            <p:cNvPr id="98" name="Shape 35"/>
+            <p:cNvSpPr/>
+            <p:nvPr/>
+          </p:nvSpPr>
+          <p:spPr>
+            <a:xfrm>
+              <a:off x="5892800" y="5599562"/>
+              <a:ext cx="761427" cy="553998"/>
+            </a:xfrm>
+            <a:prstGeom prst="rect">
+              <a:avLst/>
+            </a:prstGeom>
+            <a:ln/>
+            <a:extLst>
+              <a:ext uri="{C572A759-6A51-4108-AA02-DFA0A04FC94B}">
+                <ma14:wrappingTextBoxFlag xmlns:ma14="http://schemas.microsoft.com/office/mac/drawingml/2011/main" xmlns="" val="1"/>
+              </a:ext>
+            </a:extLst>
+          </p:spPr>
+          <p:style>
+            <a:lnRef idx="2">
+              <a:schemeClr val="accent5"/>
+            </a:lnRef>
+            <a:fillRef idx="1">
+              <a:schemeClr val="lt1"/>
+            </a:fillRef>
+            <a:effectRef idx="0">
+              <a:schemeClr val="accent5"/>
+            </a:effectRef>
+            <a:fontRef idx="minor">
+              <a:schemeClr val="dk1"/>
+            </a:fontRef>
+          </p:style>
+          <p:txBody>
+            <a:bodyPr wrap="none" lIns="0" tIns="0" rIns="0" bIns="0" anchor="ctr">
+              <a:spAutoFit/>
+            </a:bodyPr>
+            <a:lstStyle/>
+            <a:p>
+              <a:pPr lvl="0">
+                <a:defRPr sz="1800"/>
+              </a:pPr>
+              <a:r>
+                <a:rPr sz="3600" dirty="0">
+                  <a:solidFill>
+                    <a:srgbClr val="EC5D57"/>
+                  </a:solidFill>
+                  <a:latin typeface="Whitney Medium"/>
+                  <a:ea typeface="Whitney Medium"/>
+                  <a:cs typeface="Whitney Medium"/>
+                  <a:sym typeface="Whitney Medium"/>
+                </a:rPr>
+                <a:t>$</a:t>
+              </a:r>
+              <a:r>
+                <a:rPr sz="3600" dirty="0" smtClean="0">
+                  <a:solidFill>
+                    <a:srgbClr val="EC5D57"/>
+                  </a:solidFill>
+                  <a:latin typeface="Whitney Medium"/>
+                  <a:ea typeface="Whitney Medium"/>
+                  <a:cs typeface="Whitney Medium"/>
+                  <a:sym typeface="Whitney Medium"/>
+                </a:rPr>
+                <a:t>R</a:t>
+              </a:r>
+              <a:r>
+                <a:rPr lang="en-US" sz="3600" baseline="-5999" dirty="0" smtClean="0">
+                  <a:solidFill>
+                    <a:srgbClr val="EC5D57"/>
+                  </a:solidFill>
+                  <a:latin typeface="Whitney Medium"/>
+                  <a:ea typeface="Whitney Medium"/>
+                  <a:cs typeface="Whitney Medium"/>
+                  <a:sym typeface="Whitney Medium"/>
+                </a:rPr>
+                <a:t>3</a:t>
+              </a:r>
+              <a:endParaRPr sz="3600" baseline="-5999" dirty="0">
+                <a:solidFill>
+                  <a:srgbClr val="EC5D57"/>
+                </a:solidFill>
+                <a:latin typeface="Whitney Medium"/>
+                <a:ea typeface="Whitney Medium"/>
+                <a:cs typeface="Whitney Medium"/>
+                <a:sym typeface="Whitney Medium"/>
+              </a:endParaRPr>
+            </a:p>
+          </p:txBody>
+        </p:sp>
+      </p:grpSp>
+    </p:spTree>
+    <p:extLst>
+      <p:ext uri="{BB962C8B-B14F-4D97-AF65-F5344CB8AC3E}">
+        <p14:creationId xmlns:p14="http://schemas.microsoft.com/office/powerpoint/2010/main" val="763690949"/>
+      </p:ext>
+    </p:extLst>
+  </p:cSld>
+  <p:clrMapOvr>
+    <a:masterClrMapping/>
+  </p:clrMapOvr>
+  <p:transition spd="med"/>
+</p:sld>
+</file>
+
 <file path=ppt/slides/slide2.xml><?xml version="1.0" encoding="utf-8"?>
 <p:sld xmlns:a="http://schemas.openxmlformats.org/drawingml/2006/main" xmlns:r="http://schemas.openxmlformats.org/officeDocument/2006/relationships" xmlns:p="http://schemas.openxmlformats.org/presentationml/2006/main">
   <p:cSld>

</xml_diff>